<commit_message>
correction excel erreur utilité additive et powerpoint
</commit_message>
<xml_diff>
--- a/Présentation.pptx
+++ b/Présentation.pptx
@@ -213,7 +213,7 @@
           <c:spPr>
             <a:ln w="28575" cap="rnd">
               <a:solidFill>
-                <a:schemeClr val="accent2"/>
+                <a:schemeClr val="accent1"/>
               </a:solidFill>
               <a:round/>
             </a:ln>
@@ -3625,7 +3625,7 @@
           <a:p>
             <a:fld id="{A520C422-813A-3F44-A691-71093E05FC1B}" type="datetimeFigureOut">
               <a:rPr lang="en-US" smtClean="0"/>
-              <a:t>5/9/2024</a:t>
+              <a:t>5/12/24</a:t>
             </a:fld>
             <a:endParaRPr lang="en-US"/>
           </a:p>
@@ -3893,6 +3893,90 @@
 </p:notesMaster>
 </file>
 
+<file path=ppt/notesSlides/notesSlide1.xml><?xml version="1.0" encoding="utf-8"?>
+<p:notes xmlns:a="http://schemas.openxmlformats.org/drawingml/2006/main" xmlns:r="http://schemas.openxmlformats.org/officeDocument/2006/relationships" xmlns:p="http://schemas.openxmlformats.org/presentationml/2006/main">
+  <p:cSld>
+    <p:spTree>
+      <p:nvGrpSpPr>
+        <p:cNvPr id="1" name=""/>
+        <p:cNvGrpSpPr/>
+        <p:nvPr/>
+      </p:nvGrpSpPr>
+      <p:grpSpPr>
+        <a:xfrm>
+          <a:off x="0" y="0"/>
+          <a:ext cx="0" cy="0"/>
+          <a:chOff x="0" y="0"/>
+          <a:chExt cx="0" cy="0"/>
+        </a:xfrm>
+      </p:grpSpPr>
+      <p:sp>
+        <p:nvSpPr>
+          <p:cNvPr id="2" name="Espace réservé de l'image des diapositives 1"/>
+          <p:cNvSpPr>
+            <a:spLocks noGrp="1" noRot="1" noChangeAspect="1"/>
+          </p:cNvSpPr>
+          <p:nvPr>
+            <p:ph type="sldImg"/>
+          </p:nvPr>
+        </p:nvSpPr>
+        <p:spPr/>
+      </p:sp>
+      <p:sp>
+        <p:nvSpPr>
+          <p:cNvPr id="3" name="Espace réservé des notes 2"/>
+          <p:cNvSpPr>
+            <a:spLocks noGrp="1"/>
+          </p:cNvSpPr>
+          <p:nvPr>
+            <p:ph type="body" idx="1"/>
+          </p:nvPr>
+        </p:nvSpPr>
+        <p:spPr/>
+        <p:txBody>
+          <a:bodyPr/>
+          <a:lstStyle/>
+          <a:p>
+            <a:endParaRPr lang="en-US" dirty="0"/>
+          </a:p>
+        </p:txBody>
+      </p:sp>
+      <p:sp>
+        <p:nvSpPr>
+          <p:cNvPr id="4" name="Espace réservé du numéro de diapositive 3"/>
+          <p:cNvSpPr>
+            <a:spLocks noGrp="1"/>
+          </p:cNvSpPr>
+          <p:nvPr>
+            <p:ph type="sldNum" sz="quarter" idx="5"/>
+          </p:nvPr>
+        </p:nvSpPr>
+        <p:spPr/>
+        <p:txBody>
+          <a:bodyPr/>
+          <a:lstStyle/>
+          <a:p>
+            <a:fld id="{05B89648-FB13-0940-8D97-D15CB3232B36}" type="slidenum">
+              <a:rPr lang="en-US" smtClean="0"/>
+              <a:t>4</a:t>
+            </a:fld>
+            <a:endParaRPr lang="en-US"/>
+          </a:p>
+        </p:txBody>
+      </p:sp>
+    </p:spTree>
+    <p:extLst>
+      <p:ext uri="{BB962C8B-B14F-4D97-AF65-F5344CB8AC3E}">
+        <p14:creationId xmlns:p14="http://schemas.microsoft.com/office/powerpoint/2010/main" val="2010270698"/>
+      </p:ext>
+    </p:extLst>
+  </p:cSld>
+  <p:clrMapOvr>
+    <a:masterClrMapping/>
+  </p:clrMapOvr>
+</p:notes>
+</file>
+
 <file path=ppt/slideLayouts/slideLayout1.xml><?xml version="1.0" encoding="utf-8"?>
 <p:sldLayout xmlns:a="http://schemas.openxmlformats.org/drawingml/2006/main" xmlns:r="http://schemas.openxmlformats.org/officeDocument/2006/relationships" xmlns:p="http://schemas.openxmlformats.org/presentationml/2006/main" type="title" preserve="1">
   <p:cSld name="Diapositive de titre">
@@ -4042,7 +4126,7 @@
           <a:p>
             <a:fld id="{F8AA2E48-9D38-1148-A1F8-55E02F3D00C7}" type="datetime1">
               <a:rPr lang="fr-BE" smtClean="0"/>
-              <a:t>09-05-24</a:t>
+              <a:t>12/05/24</a:t>
             </a:fld>
             <a:endParaRPr lang="en-US"/>
           </a:p>
@@ -4242,7 +4326,7 @@
           <a:p>
             <a:fld id="{66768BE3-807B-494A-83BF-064F57A06B19}" type="datetime1">
               <a:rPr lang="fr-BE" smtClean="0"/>
-              <a:t>09-05-24</a:t>
+              <a:t>12/05/24</a:t>
             </a:fld>
             <a:endParaRPr lang="en-US"/>
           </a:p>
@@ -4452,7 +4536,7 @@
           <a:p>
             <a:fld id="{DC62222D-897D-A84C-B71E-A281EDE7B18C}" type="datetime1">
               <a:rPr lang="fr-BE" smtClean="0"/>
-              <a:t>09-05-24</a:t>
+              <a:t>12/05/24</a:t>
             </a:fld>
             <a:endParaRPr lang="en-US"/>
           </a:p>
@@ -4652,7 +4736,7 @@
           <a:p>
             <a:fld id="{4BEE93AE-82E3-B442-B9B4-D033DF2D67F4}" type="datetime1">
               <a:rPr lang="fr-BE" smtClean="0"/>
-              <a:t>09-05-24</a:t>
+              <a:t>12/05/24</a:t>
             </a:fld>
             <a:endParaRPr lang="en-US"/>
           </a:p>
@@ -4942,7 +5026,7 @@
           <a:p>
             <a:fld id="{5503C6D9-23DA-0144-8467-864E61C10C17}" type="datetime1">
               <a:rPr lang="fr-BE" smtClean="0"/>
-              <a:t>09-05-24</a:t>
+              <a:t>12/05/24</a:t>
             </a:fld>
             <a:endParaRPr lang="en-US"/>
           </a:p>
@@ -5210,7 +5294,7 @@
           <a:p>
             <a:fld id="{161CF3F2-5CC3-B340-92AE-1C736A6B052F}" type="datetime1">
               <a:rPr lang="fr-BE" smtClean="0"/>
-              <a:t>09-05-24</a:t>
+              <a:t>12/05/24</a:t>
             </a:fld>
             <a:endParaRPr lang="en-US"/>
           </a:p>
@@ -5625,7 +5709,7 @@
           <a:p>
             <a:fld id="{1AEDF335-0283-734A-855C-D1FCA9AB3534}" type="datetime1">
               <a:rPr lang="fr-BE" smtClean="0"/>
-              <a:t>09-05-24</a:t>
+              <a:t>12/05/24</a:t>
             </a:fld>
             <a:endParaRPr lang="en-US"/>
           </a:p>
@@ -5767,7 +5851,7 @@
           <a:p>
             <a:fld id="{CBD683F2-F6A4-7247-8FBE-15BD9660A086}" type="datetime1">
               <a:rPr lang="fr-BE" smtClean="0"/>
-              <a:t>09-05-24</a:t>
+              <a:t>12/05/24</a:t>
             </a:fld>
             <a:endParaRPr lang="en-US"/>
           </a:p>
@@ -5880,7 +5964,7 @@
           <a:p>
             <a:fld id="{E84CC7E5-5B97-1C45-8A8E-933A5D2153AE}" type="datetime1">
               <a:rPr lang="fr-BE" smtClean="0"/>
-              <a:t>09-05-24</a:t>
+              <a:t>12/05/24</a:t>
             </a:fld>
             <a:endParaRPr lang="en-US"/>
           </a:p>
@@ -6193,7 +6277,7 @@
           <a:p>
             <a:fld id="{B4B383E0-DCF3-2B45-8DD2-0000B254B966}" type="datetime1">
               <a:rPr lang="fr-BE" smtClean="0"/>
-              <a:t>09-05-24</a:t>
+              <a:t>12/05/24</a:t>
             </a:fld>
             <a:endParaRPr lang="en-US"/>
           </a:p>
@@ -6482,7 +6566,7 @@
           <a:p>
             <a:fld id="{02E31A0A-61D5-6A4A-AF3E-C2959132DE99}" type="datetime1">
               <a:rPr lang="fr-BE" smtClean="0"/>
-              <a:t>09-05-24</a:t>
+              <a:t>12/05/24</a:t>
             </a:fld>
             <a:endParaRPr lang="en-US"/>
           </a:p>
@@ -6725,7 +6809,7 @@
           <a:p>
             <a:fld id="{62C37565-1C6C-EC4F-8FEA-CA0EFBC7BBB4}" type="datetime1">
               <a:rPr lang="fr-BE" smtClean="0"/>
-              <a:t>09-05-24</a:t>
+              <a:t>12/05/24</a:t>
             </a:fld>
             <a:endParaRPr lang="en-US"/>
           </a:p>
@@ -7714,7 +7798,7 @@
           <p:nvPr>
             <p:extLst>
               <p:ext uri="{D42A27DB-BD31-4B8C-83A1-F6EECF244321}">
-                <p14:modId xmlns:p14="http://schemas.microsoft.com/office/powerpoint/2010/main" val="1119969493"/>
+                <p14:modId xmlns:p14="http://schemas.microsoft.com/office/powerpoint/2010/main" val="592763495"/>
               </p:ext>
             </p:extLst>
           </p:nvPr>
@@ -8046,13 +8130,13 @@
                             <a:srgbClr val="FF0000"/>
                           </a:solidFill>
                           <a:effectLst/>
-                          <a:latin typeface="Aptos "/>
+                          <a:latin typeface="+mn-lt"/>
                         </a:rPr>
                         <a:t>1</a:t>
                       </a:r>
                     </a:p>
                   </a:txBody>
-                  <a:tcPr marL="7620" marR="7620" marT="7620" marB="0" anchor="b">
+                  <a:tcPr marL="9525" marR="9525" marT="9525" marB="0" anchor="b">
                     <a:lnR w="38100" cap="flat" cmpd="sng" algn="ctr">
                       <a:solidFill>
                         <a:schemeClr val="tx1"/>
@@ -8173,13 +8257,13 @@
                             <a:srgbClr val="000000"/>
                           </a:solidFill>
                           <a:effectLst/>
-                          <a:latin typeface="Aptos Narrow" panose="020B0004020202020204" pitchFamily="34" charset="0"/>
-                        </a:rPr>
-                        <a:t>5</a:t>
-                      </a:r>
-                    </a:p>
-                  </a:txBody>
-                  <a:tcPr marL="7620" marR="7620" marT="7620" marB="0" anchor="b">
+                          <a:latin typeface="+mn-lt"/>
+                        </a:rPr>
+                        <a:t>6</a:t>
+                      </a:r>
+                    </a:p>
+                  </a:txBody>
+                  <a:tcPr marL="9525" marR="9525" marT="9525" marB="0" anchor="b">
                     <a:lnR w="38100" cap="flat" cmpd="sng" algn="ctr">
                       <a:solidFill>
                         <a:schemeClr val="tx1"/>
@@ -8295,18 +8379,18 @@
                     <a:p>
                       <a:pPr algn="ctr" fontAlgn="b"/>
                       <a:r>
-                        <a:rPr lang="fr-BE" sz="1600" b="0" i="0" u="none" strike="noStrike">
-                          <a:solidFill>
-                            <a:srgbClr val="000000"/>
-                          </a:solidFill>
-                          <a:effectLst/>
-                          <a:latin typeface="Aptos Narrow" panose="020B0004020202020204" pitchFamily="34" charset="0"/>
-                        </a:rPr>
-                        <a:t>4</a:t>
-                      </a:r>
-                    </a:p>
-                  </a:txBody>
-                  <a:tcPr marL="7620" marR="7620" marT="7620" marB="0" anchor="b">
+                        <a:rPr lang="fr-BE" sz="1600" b="0" i="0" u="none" strike="noStrike" dirty="0">
+                          <a:solidFill>
+                            <a:srgbClr val="000000"/>
+                          </a:solidFill>
+                          <a:effectLst/>
+                          <a:latin typeface="+mn-lt"/>
+                        </a:rPr>
+                        <a:t>3</a:t>
+                      </a:r>
+                    </a:p>
+                  </a:txBody>
+                  <a:tcPr marL="9525" marR="9525" marT="9525" marB="0" anchor="b">
                     <a:lnR w="38100" cap="flat" cmpd="sng" algn="ctr">
                       <a:solidFill>
                         <a:schemeClr val="tx1"/>
@@ -8422,18 +8506,18 @@
                     <a:p>
                       <a:pPr algn="ctr" fontAlgn="b"/>
                       <a:r>
-                        <a:rPr lang="fr-BE" sz="1600" b="0" i="0" u="none" strike="noStrike">
-                          <a:solidFill>
-                            <a:srgbClr val="000000"/>
-                          </a:solidFill>
-                          <a:effectLst/>
-                          <a:latin typeface="Aptos Narrow" panose="020B0004020202020204" pitchFamily="34" charset="0"/>
-                        </a:rPr>
-                        <a:t>6</a:t>
-                      </a:r>
-                    </a:p>
-                  </a:txBody>
-                  <a:tcPr marL="7620" marR="7620" marT="7620" marB="0" anchor="b">
+                        <a:rPr lang="fr-BE" sz="1600" b="0" i="0" u="none" strike="noStrike" dirty="0">
+                          <a:solidFill>
+                            <a:srgbClr val="000000"/>
+                          </a:solidFill>
+                          <a:effectLst/>
+                          <a:latin typeface="+mn-lt"/>
+                        </a:rPr>
+                        <a:t>7</a:t>
+                      </a:r>
+                    </a:p>
+                  </a:txBody>
+                  <a:tcPr marL="9525" marR="9525" marT="9525" marB="0" anchor="b">
                     <a:lnR w="38100" cap="flat" cmpd="sng" algn="ctr">
                       <a:solidFill>
                         <a:schemeClr val="tx1"/>
@@ -8452,7 +8536,7 @@
                     <a:p>
                       <a:pPr algn="ctr" fontAlgn="b"/>
                       <a:r>
-                        <a:rPr lang="fr-BE" sz="1600" b="0" i="0" u="none" strike="noStrike">
+                        <a:rPr lang="fr-BE" sz="1600" b="0" i="0" u="none" strike="noStrike" dirty="0">
                           <a:solidFill>
                             <a:srgbClr val="000000"/>
                           </a:solidFill>
@@ -8549,18 +8633,18 @@
                     <a:p>
                       <a:pPr algn="ctr" fontAlgn="b"/>
                       <a:r>
-                        <a:rPr lang="fr-BE" sz="1600" b="0" i="0" u="none" strike="noStrike">
-                          <a:solidFill>
-                            <a:srgbClr val="000000"/>
-                          </a:solidFill>
-                          <a:effectLst/>
-                          <a:latin typeface="Aptos Narrow" panose="020B0004020202020204" pitchFamily="34" charset="0"/>
-                        </a:rPr>
-                        <a:t>7</a:t>
-                      </a:r>
-                    </a:p>
-                  </a:txBody>
-                  <a:tcPr marL="7620" marR="7620" marT="7620" marB="0" anchor="b">
+                        <a:rPr lang="fr-BE" sz="1600" b="0" i="0" u="none" strike="noStrike" dirty="0">
+                          <a:solidFill>
+                            <a:srgbClr val="000000"/>
+                          </a:solidFill>
+                          <a:effectLst/>
+                          <a:latin typeface="+mn-lt"/>
+                        </a:rPr>
+                        <a:t>4</a:t>
+                      </a:r>
+                    </a:p>
+                  </a:txBody>
+                  <a:tcPr marL="9525" marR="9525" marT="9525" marB="0" anchor="b">
                     <a:lnR w="38100" cap="flat" cmpd="sng" algn="ctr">
                       <a:solidFill>
                         <a:schemeClr val="tx1"/>
@@ -8681,13 +8765,13 @@
                             <a:srgbClr val="000000"/>
                           </a:solidFill>
                           <a:effectLst/>
-                          <a:latin typeface="Aptos Narrow" panose="020B0004020202020204" pitchFamily="34" charset="0"/>
-                        </a:rPr>
-                        <a:t>2</a:t>
-                      </a:r>
-                    </a:p>
-                  </a:txBody>
-                  <a:tcPr marL="7620" marR="7620" marT="7620" marB="0" anchor="b">
+                          <a:latin typeface="+mn-lt"/>
+                        </a:rPr>
+                        <a:t>8</a:t>
+                      </a:r>
+                    </a:p>
+                  </a:txBody>
+                  <a:tcPr marL="9525" marR="9525" marT="9525" marB="0" anchor="b">
                     <a:lnR w="38100" cap="flat" cmpd="sng" algn="ctr">
                       <a:solidFill>
                         <a:schemeClr val="tx1"/>
@@ -8706,7 +8790,7 @@
                     <a:p>
                       <a:pPr algn="ctr" fontAlgn="b"/>
                       <a:r>
-                        <a:rPr lang="fr-BE" sz="1600" b="0" i="0" u="none" strike="noStrike">
+                        <a:rPr lang="fr-BE" sz="1600" b="0" i="0" u="none" strike="noStrike" dirty="0">
                           <a:solidFill>
                             <a:srgbClr val="000000"/>
                           </a:solidFill>
@@ -8803,18 +8887,18 @@
                     <a:p>
                       <a:pPr algn="ctr" fontAlgn="b"/>
                       <a:r>
-                        <a:rPr lang="fr-BE" sz="1600" b="0" i="0" u="none" strike="noStrike">
-                          <a:solidFill>
-                            <a:srgbClr val="000000"/>
-                          </a:solidFill>
-                          <a:effectLst/>
-                          <a:latin typeface="Aptos Narrow" panose="020B0004020202020204" pitchFamily="34" charset="0"/>
-                        </a:rPr>
-                        <a:t>7</a:t>
-                      </a:r>
-                    </a:p>
-                  </a:txBody>
-                  <a:tcPr marL="7620" marR="7620" marT="7620" marB="0" anchor="b">
+                        <a:rPr lang="fr-BE" sz="1600" b="0" i="0" u="none" strike="noStrike" dirty="0">
+                          <a:solidFill>
+                            <a:srgbClr val="000000"/>
+                          </a:solidFill>
+                          <a:effectLst/>
+                          <a:latin typeface="+mn-lt"/>
+                        </a:rPr>
+                        <a:t>5</a:t>
+                      </a:r>
+                    </a:p>
+                  </a:txBody>
+                  <a:tcPr marL="9525" marR="9525" marT="9525" marB="0" anchor="b">
                     <a:lnR w="38100" cap="flat" cmpd="sng" algn="ctr">
                       <a:solidFill>
                         <a:schemeClr val="tx1"/>
@@ -8930,18 +9014,18 @@
                     <a:p>
                       <a:pPr algn="ctr" fontAlgn="b"/>
                       <a:r>
-                        <a:rPr lang="fr-BE" sz="1600" b="0" i="0" u="none" strike="noStrike">
-                          <a:solidFill>
-                            <a:srgbClr val="000000"/>
-                          </a:solidFill>
-                          <a:effectLst/>
-                          <a:latin typeface="Aptos Narrow" panose="020B0004020202020204" pitchFamily="34" charset="0"/>
-                        </a:rPr>
-                        <a:t>3</a:t>
-                      </a:r>
-                    </a:p>
-                  </a:txBody>
-                  <a:tcPr marL="7620" marR="7620" marT="7620" marB="0" anchor="b">
+                        <a:rPr lang="fr-BE" sz="1600" b="0" i="0" u="none" strike="noStrike" dirty="0">
+                          <a:solidFill>
+                            <a:srgbClr val="000000"/>
+                          </a:solidFill>
+                          <a:effectLst/>
+                          <a:latin typeface="+mn-lt"/>
+                        </a:rPr>
+                        <a:t>2</a:t>
+                      </a:r>
+                    </a:p>
+                  </a:txBody>
+                  <a:tcPr marL="9525" marR="9525" marT="9525" marB="0" anchor="b">
                     <a:lnR w="38100" cap="flat" cmpd="sng" algn="ctr">
                       <a:solidFill>
                         <a:schemeClr val="tx1"/>
@@ -9062,13 +9146,13 @@
                             <a:srgbClr val="000000"/>
                           </a:solidFill>
                           <a:effectLst/>
-                          <a:latin typeface="Aptos Narrow" panose="020B0004020202020204" pitchFamily="34" charset="0"/>
+                          <a:latin typeface="+mn-lt"/>
                         </a:rPr>
                         <a:t>9</a:t>
                       </a:r>
                     </a:p>
                   </a:txBody>
-                  <a:tcPr marL="7620" marR="7620" marT="7620" marB="0" anchor="b">
+                  <a:tcPr marL="9525" marR="9525" marT="9525" marB="0" anchor="b">
                     <a:lnR w="38100" cap="flat" cmpd="sng" algn="ctr">
                       <a:solidFill>
                         <a:schemeClr val="tx1"/>
@@ -9087,7 +9171,7 @@
                     <a:p>
                       <a:pPr algn="ctr" fontAlgn="b"/>
                       <a:r>
-                        <a:rPr lang="fr-BE" sz="1600" b="0" i="0" u="none" strike="noStrike">
+                        <a:rPr lang="fr-BE" sz="1600" b="0" i="0" u="none" strike="noStrike" dirty="0">
                           <a:solidFill>
                             <a:srgbClr val="000000"/>
                           </a:solidFill>
@@ -9117,7 +9201,7 @@
                     <a:p>
                       <a:pPr algn="ctr" fontAlgn="b"/>
                       <a:r>
-                        <a:rPr lang="fr-BE" sz="1600" b="0" i="0" u="none" strike="noStrike">
+                        <a:rPr lang="fr-BE" sz="1600" b="0" i="0" u="none" strike="noStrike" dirty="0">
                           <a:solidFill>
                             <a:srgbClr val="000000"/>
                           </a:solidFill>
@@ -9995,52 +10079,6 @@
       </p:sp>
       <p:sp>
         <p:nvSpPr>
-          <p:cNvPr id="24" name="Étoile : 5 branches 23">
-            <a:extLst>
-              <a:ext uri="{FF2B5EF4-FFF2-40B4-BE49-F238E27FC236}">
-                <a16:creationId xmlns:a16="http://schemas.microsoft.com/office/drawing/2014/main" id="{BA3DDBC1-FBAD-6133-5503-FC21134A937B}"/>
-              </a:ext>
-            </a:extLst>
-          </p:cNvPr>
-          <p:cNvSpPr/>
-          <p:nvPr/>
-        </p:nvSpPr>
-        <p:spPr>
-          <a:xfrm>
-            <a:off x="2850722" y="6935192"/>
-            <a:ext cx="93733" cy="95631"/>
-          </a:xfrm>
-          <a:prstGeom prst="star5">
-            <a:avLst/>
-          </a:prstGeom>
-        </p:spPr>
-        <p:style>
-          <a:lnRef idx="2">
-            <a:schemeClr val="dk1">
-              <a:shade val="15000"/>
-            </a:schemeClr>
-          </a:lnRef>
-          <a:fillRef idx="1">
-            <a:schemeClr val="dk1"/>
-          </a:fillRef>
-          <a:effectRef idx="0">
-            <a:schemeClr val="dk1"/>
-          </a:effectRef>
-          <a:fontRef idx="minor">
-            <a:schemeClr val="lt1"/>
-          </a:fontRef>
-        </p:style>
-        <p:txBody>
-          <a:bodyPr rtlCol="0" anchor="ctr"/>
-          <a:lstStyle/>
-          <a:p>
-            <a:pPr algn="ctr"/>
-            <a:endParaRPr lang="en-US"/>
-          </a:p>
-        </p:txBody>
-      </p:sp>
-      <p:sp>
-        <p:nvSpPr>
           <p:cNvPr id="25" name="Rectangle 24">
             <a:extLst>
               <a:ext uri="{FF2B5EF4-FFF2-40B4-BE49-F238E27FC236}">
@@ -10516,14 +10554,14 @@
           <p:nvPr>
             <p:extLst>
               <p:ext uri="{D42A27DB-BD31-4B8C-83A1-F6EECF244321}">
-                <p14:modId xmlns:p14="http://schemas.microsoft.com/office/powerpoint/2010/main" val="3563454760"/>
+                <p14:modId xmlns:p14="http://schemas.microsoft.com/office/powerpoint/2010/main" val="1303950459"/>
               </p:ext>
             </p:extLst>
           </p:nvPr>
         </p:nvGraphicFramePr>
         <p:xfrm>
           <a:off x="310896" y="765667"/>
-          <a:ext cx="11298744" cy="5760640"/>
+          <a:ext cx="11298744" cy="5426806"/>
         </p:xfrm>
         <a:graphic>
           <a:graphicData uri="http://schemas.openxmlformats.org/drawingml/2006/table">
@@ -10532,70 +10570,70 @@
                 <a:tableStyleId>{5C22544A-7EE6-4342-B048-85BDC9FD1C3A}</a:tableStyleId>
               </a:tblPr>
               <a:tblGrid>
-                <a:gridCol w="895028">
+                <a:gridCol w="3134757">
                   <a:extLst>
                     <a:ext uri="{9D8B030D-6E8A-4147-A177-3AD203B41FA5}">
                       <a16:colId xmlns:a16="http://schemas.microsoft.com/office/drawing/2014/main" val="3974868600"/>
                     </a:ext>
                   </a:extLst>
                 </a:gridCol>
-                <a:gridCol w="987114">
+                <a:gridCol w="641897">
                   <a:extLst>
                     <a:ext uri="{9D8B030D-6E8A-4147-A177-3AD203B41FA5}">
                       <a16:colId xmlns:a16="http://schemas.microsoft.com/office/drawing/2014/main" val="2318229997"/>
                     </a:ext>
                   </a:extLst>
                 </a:gridCol>
-                <a:gridCol w="941073">
+                <a:gridCol w="811454">
                   <a:extLst>
                     <a:ext uri="{9D8B030D-6E8A-4147-A177-3AD203B41FA5}">
                       <a16:colId xmlns:a16="http://schemas.microsoft.com/office/drawing/2014/main" val="4264433497"/>
                     </a:ext>
                   </a:extLst>
                 </a:gridCol>
-                <a:gridCol w="1173892">
+                <a:gridCol w="859899">
                   <a:extLst>
                     <a:ext uri="{9D8B030D-6E8A-4147-A177-3AD203B41FA5}">
                       <a16:colId xmlns:a16="http://schemas.microsoft.com/office/drawing/2014/main" val="3073352192"/>
                     </a:ext>
                   </a:extLst>
                 </a:gridCol>
-                <a:gridCol w="1128442">
+                <a:gridCol w="823566">
                   <a:extLst>
                     <a:ext uri="{9D8B030D-6E8A-4147-A177-3AD203B41FA5}">
                       <a16:colId xmlns:a16="http://schemas.microsoft.com/office/drawing/2014/main" val="2832415336"/>
                     </a:ext>
                   </a:extLst>
                 </a:gridCol>
-                <a:gridCol w="1345091">
+                <a:gridCol w="1090013">
                   <a:extLst>
                     <a:ext uri="{9D8B030D-6E8A-4147-A177-3AD203B41FA5}">
                       <a16:colId xmlns:a16="http://schemas.microsoft.com/office/drawing/2014/main" val="3981427219"/>
                     </a:ext>
                   </a:extLst>
                 </a:gridCol>
-                <a:gridCol w="1434398">
+                <a:gridCol w="1005235">
                   <a:extLst>
                     <a:ext uri="{9D8B030D-6E8A-4147-A177-3AD203B41FA5}">
                       <a16:colId xmlns:a16="http://schemas.microsoft.com/office/drawing/2014/main" val="1458410018"/>
                     </a:ext>
                   </a:extLst>
                 </a:gridCol>
-                <a:gridCol w="1511560">
+                <a:gridCol w="1049777">
                   <a:extLst>
                     <a:ext uri="{9D8B030D-6E8A-4147-A177-3AD203B41FA5}">
                       <a16:colId xmlns:a16="http://schemas.microsoft.com/office/drawing/2014/main" val="3989746092"/>
                     </a:ext>
                   </a:extLst>
                 </a:gridCol>
-                <a:gridCol w="941073">
+                <a:gridCol w="861848">
                   <a:extLst>
                     <a:ext uri="{9D8B030D-6E8A-4147-A177-3AD203B41FA5}">
                       <a16:colId xmlns:a16="http://schemas.microsoft.com/office/drawing/2014/main" val="2357646832"/>
                     </a:ext>
                   </a:extLst>
                 </a:gridCol>
-                <a:gridCol w="941073">
+                <a:gridCol w="1020298">
                   <a:extLst>
                     <a:ext uri="{9D8B030D-6E8A-4147-A177-3AD203B41FA5}">
                       <a16:colId xmlns:a16="http://schemas.microsoft.com/office/drawing/2014/main" val="1527988512"/>
@@ -10603,7 +10641,7 @@
                   </a:extLst>
                 </a:gridCol>
               </a:tblGrid>
-              <a:tr h="515090">
+              <a:tr h="1377765">
                 <a:tc>
                   <a:txBody>
                     <a:bodyPr/>
@@ -11014,7 +11052,7 @@
                   </a:ext>
                 </a:extLst>
               </a:tr>
-              <a:tr h="546789">
+              <a:tr h="420533">
                 <a:tc>
                   <a:txBody>
                     <a:bodyPr/>
@@ -11221,7 +11259,7 @@
                   </a:ext>
                 </a:extLst>
               </a:tr>
-              <a:tr h="729052">
+              <a:tr h="414518">
                 <a:tc>
                   <a:txBody>
                     <a:bodyPr/>
@@ -11428,7 +11466,7 @@
                   </a:ext>
                 </a:extLst>
               </a:tr>
-              <a:tr h="364526">
+              <a:tr h="216408">
                 <a:tc>
                   <a:txBody>
                     <a:bodyPr/>
@@ -11596,7 +11634,7 @@
                     <a:p>
                       <a:pPr algn="r" fontAlgn="b"/>
                       <a:r>
-                        <a:rPr lang="fr-BE" sz="1200" b="0" i="0" u="none" strike="noStrike">
+                        <a:rPr lang="fr-BE" sz="1200" b="0" i="0" u="none" strike="noStrike" dirty="0">
                           <a:solidFill>
                             <a:srgbClr val="000000"/>
                           </a:solidFill>
@@ -11635,7 +11673,7 @@
                   </a:ext>
                 </a:extLst>
               </a:tr>
-              <a:tr h="729052">
+              <a:tr h="589936">
                 <a:tc>
                   <a:txBody>
                     <a:bodyPr/>
@@ -11842,7 +11880,7 @@
                   </a:ext>
                 </a:extLst>
               </a:tr>
-              <a:tr h="550471">
+              <a:tr h="423421">
                 <a:tc>
                   <a:txBody>
                     <a:bodyPr/>
@@ -12049,7 +12087,7 @@
                   </a:ext>
                 </a:extLst>
               </a:tr>
-              <a:tr h="911315">
+              <a:tr h="582837">
                 <a:tc>
                   <a:txBody>
                     <a:bodyPr/>
@@ -12837,7 +12875,7 @@
           <p:nvPr>
             <p:extLst>
               <p:ext uri="{D42A27DB-BD31-4B8C-83A1-F6EECF244321}">
-                <p14:modId xmlns:p14="http://schemas.microsoft.com/office/powerpoint/2010/main" val="4083690386"/>
+                <p14:modId xmlns:p14="http://schemas.microsoft.com/office/powerpoint/2010/main" val="1985463568"/>
               </p:ext>
             </p:extLst>
           </p:nvPr>
@@ -13076,12 +13114,12 @@
                     <a:p>
                       <a:pPr algn="r" fontAlgn="b"/>
                       <a:r>
-                        <a:rPr lang="fr-BE" sz="1600" u="none" strike="noStrike">
+                        <a:rPr lang="fr-BE" sz="1600" u="none" strike="noStrike" dirty="0">
                           <a:effectLst/>
                         </a:rPr>
                         <a:t>650</a:t>
                       </a:r>
-                      <a:endParaRPr lang="fr-BE" sz="1600" b="0" i="0" u="none" strike="noStrike">
+                      <a:endParaRPr lang="fr-BE" sz="1600" b="0" i="0" u="none" strike="noStrike" dirty="0">
                         <a:solidFill>
                           <a:srgbClr val="000000"/>
                         </a:solidFill>
@@ -14692,12 +14730,12 @@
                     <a:p>
                       <a:pPr algn="r" fontAlgn="b"/>
                       <a:r>
-                        <a:rPr lang="fr-BE" sz="1600" u="none" strike="noStrike">
+                        <a:rPr lang="fr-BE" sz="1600" u="none" strike="noStrike" dirty="0">
                           <a:effectLst/>
                         </a:rPr>
                         <a:t>1</a:t>
                       </a:r>
-                      <a:endParaRPr lang="fr-BE" sz="1600" b="0" i="0" u="none" strike="noStrike">
+                      <a:endParaRPr lang="fr-BE" sz="1600" b="0" i="0" u="none" strike="noStrike" dirty="0">
                         <a:solidFill>
                           <a:srgbClr val="000000"/>
                         </a:solidFill>
@@ -14716,12 +14754,12 @@
                     <a:p>
                       <a:pPr algn="r" fontAlgn="b"/>
                       <a:r>
-                        <a:rPr lang="fr-BE" sz="1600" u="none" strike="noStrike">
+                        <a:rPr lang="fr-BE" sz="1600" u="none" strike="noStrike" dirty="0">
                           <a:effectLst/>
                         </a:rPr>
                         <a:t>300</a:t>
                       </a:r>
-                      <a:endParaRPr lang="fr-BE" sz="1600" b="0" i="0" u="none" strike="noStrike">
+                      <a:endParaRPr lang="fr-BE" sz="1600" b="0" i="0" u="none" strike="noStrike" dirty="0">
                         <a:solidFill>
                           <a:srgbClr val="000000"/>
                         </a:solidFill>
@@ -14740,12 +14778,12 @@
                     <a:p>
                       <a:pPr algn="r" fontAlgn="b"/>
                       <a:r>
-                        <a:rPr lang="fr-BE" sz="1600" u="none" strike="noStrike">
+                        <a:rPr lang="fr-BE" sz="1600" u="none" strike="noStrike" dirty="0">
                           <a:effectLst/>
                         </a:rPr>
                         <a:t>2</a:t>
                       </a:r>
-                      <a:endParaRPr lang="fr-BE" sz="1600" b="0" i="0" u="none" strike="noStrike">
+                      <a:endParaRPr lang="fr-BE" sz="1600" b="0" i="0" u="none" strike="noStrike" dirty="0">
                         <a:solidFill>
                           <a:srgbClr val="000000"/>
                         </a:solidFill>
@@ -14764,12 +14802,12 @@
                     <a:p>
                       <a:pPr algn="r" fontAlgn="b"/>
                       <a:r>
-                        <a:rPr lang="fr-BE" sz="1600" u="none" strike="noStrike">
+                        <a:rPr lang="fr-BE" sz="1600" u="none" strike="noStrike" dirty="0">
                           <a:effectLst/>
                         </a:rPr>
                         <a:t>400</a:t>
                       </a:r>
-                      <a:endParaRPr lang="fr-BE" sz="1600" b="0" i="0" u="none" strike="noStrike">
+                      <a:endParaRPr lang="fr-BE" sz="1600" b="0" i="0" u="none" strike="noStrike" dirty="0">
                         <a:solidFill>
                           <a:srgbClr val="000000"/>
                         </a:solidFill>
@@ -14788,12 +14826,12 @@
                     <a:p>
                       <a:pPr algn="r" fontAlgn="b"/>
                       <a:r>
-                        <a:rPr lang="fr-BE" sz="1600" u="none" strike="noStrike">
+                        <a:rPr lang="fr-BE" sz="1600" u="none" strike="noStrike" dirty="0">
                           <a:effectLst/>
                         </a:rPr>
                         <a:t>2</a:t>
                       </a:r>
-                      <a:endParaRPr lang="fr-BE" sz="1600" b="0" i="0" u="none" strike="noStrike">
+                      <a:endParaRPr lang="fr-BE" sz="1600" b="0" i="0" u="none" strike="noStrike" dirty="0">
                         <a:solidFill>
                           <a:srgbClr val="000000"/>
                         </a:solidFill>
@@ -15011,12 +15049,12 @@
                     <a:p>
                       <a:pPr algn="r" fontAlgn="b"/>
                       <a:r>
-                        <a:rPr lang="fr-BE" sz="1600" u="none" strike="noStrike">
+                        <a:rPr lang="fr-BE" sz="1600" u="none" strike="noStrike" dirty="0">
                           <a:effectLst/>
                         </a:rPr>
                         <a:t>3</a:t>
                       </a:r>
-                      <a:endParaRPr lang="fr-BE" sz="1600" b="0" i="0" u="none" strike="noStrike">
+                      <a:endParaRPr lang="fr-BE" sz="1600" b="0" i="0" u="none" strike="noStrike" dirty="0">
                         <a:solidFill>
                           <a:srgbClr val="000000"/>
                         </a:solidFill>
@@ -15433,12 +15471,12 @@
                     <a:p>
                       <a:pPr algn="r" fontAlgn="b"/>
                       <a:r>
-                        <a:rPr lang="fr-BE" sz="1600" u="none" strike="noStrike">
+                        <a:rPr lang="fr-BE" sz="1600" u="none" strike="noStrike" dirty="0">
                           <a:effectLst/>
                         </a:rPr>
                         <a:t>1500</a:t>
                       </a:r>
-                      <a:endParaRPr lang="fr-BE" sz="1600" b="0" i="0" u="none" strike="noStrike">
+                      <a:endParaRPr lang="fr-BE" sz="1600" b="0" i="0" u="none" strike="noStrike" dirty="0">
                         <a:solidFill>
                           <a:srgbClr val="000000"/>
                         </a:solidFill>
@@ -15457,12 +15495,12 @@
                     <a:p>
                       <a:pPr algn="r" fontAlgn="b"/>
                       <a:r>
-                        <a:rPr lang="fr-BE" sz="1600" u="none" strike="noStrike">
+                        <a:rPr lang="fr-BE" sz="1600" u="none" strike="noStrike" dirty="0">
                           <a:effectLst/>
                         </a:rPr>
                         <a:t>5</a:t>
                       </a:r>
-                      <a:endParaRPr lang="fr-BE" sz="1600" b="0" i="0" u="none" strike="noStrike">
+                      <a:endParaRPr lang="fr-BE" sz="1600" b="0" i="0" u="none" strike="noStrike" dirty="0">
                         <a:solidFill>
                           <a:srgbClr val="000000"/>
                         </a:solidFill>
@@ -16102,12 +16140,12 @@
                     <a:p>
                       <a:pPr algn="l" fontAlgn="b"/>
                       <a:r>
-                        <a:rPr lang="fr-BE" sz="1600" u="none" strike="noStrike">
+                        <a:rPr lang="fr-BE" sz="1600" u="none" strike="noStrike" dirty="0">
                           <a:effectLst/>
                         </a:rPr>
                         <a:t> </a:t>
                       </a:r>
-                      <a:endParaRPr lang="fr-BE" sz="1600" b="0" i="0" u="none" strike="noStrike">
+                      <a:endParaRPr lang="fr-BE" sz="1600" b="0" i="0" u="none" strike="noStrike" dirty="0">
                         <a:solidFill>
                           <a:srgbClr val="000000"/>
                         </a:solidFill>
@@ -17653,7 +17691,7 @@
           <p:nvPr/>
         </p:nvPicPr>
         <p:blipFill>
-          <a:blip r:embed="rId2"/>
+          <a:blip r:embed="rId3"/>
           <a:stretch>
             <a:fillRect/>
           </a:stretch>
@@ -17683,7 +17721,7 @@
           <p:nvPr/>
         </p:nvPicPr>
         <p:blipFill rotWithShape="1">
-          <a:blip r:embed="rId2"/>
+          <a:blip r:embed="rId3"/>
           <a:srcRect l="61889" t="7298" r="25229" b="23827"/>
           <a:stretch/>
         </p:blipFill>
@@ -17712,7 +17750,7 @@
           <p:nvPr/>
         </p:nvPicPr>
         <p:blipFill>
-          <a:blip r:embed="rId3"/>
+          <a:blip r:embed="rId4"/>
           <a:stretch>
             <a:fillRect/>
           </a:stretch>
@@ -17771,7 +17809,7 @@
           <p:nvPr>
             <p:extLst>
               <p:ext uri="{D42A27DB-BD31-4B8C-83A1-F6EECF244321}">
-                <p14:modId xmlns:p14="http://schemas.microsoft.com/office/powerpoint/2010/main" val="1513567870"/>
+                <p14:modId xmlns:p14="http://schemas.microsoft.com/office/powerpoint/2010/main" val="2670155230"/>
               </p:ext>
             </p:extLst>
           </p:nvPr>
@@ -17782,7 +17820,7 @@
         </p:xfrm>
         <a:graphic>
           <a:graphicData uri="http://schemas.openxmlformats.org/drawingml/2006/chart">
-            <c:chart xmlns:c="http://schemas.openxmlformats.org/drawingml/2006/chart" xmlns:r="http://schemas.openxmlformats.org/officeDocument/2006/relationships" r:id="rId4"/>
+            <c:chart xmlns:c="http://schemas.openxmlformats.org/drawingml/2006/chart" xmlns:r="http://schemas.openxmlformats.org/officeDocument/2006/relationships" r:id="rId5"/>
           </a:graphicData>
         </a:graphic>
       </p:graphicFrame>
@@ -17801,7 +17839,7 @@
           <p:nvPr>
             <p:extLst>
               <p:ext uri="{D42A27DB-BD31-4B8C-83A1-F6EECF244321}">
-                <p14:modId xmlns:p14="http://schemas.microsoft.com/office/powerpoint/2010/main" val="3041403954"/>
+                <p14:modId xmlns:p14="http://schemas.microsoft.com/office/powerpoint/2010/main" val="1546606125"/>
               </p:ext>
             </p:extLst>
           </p:nvPr>
@@ -17812,7 +17850,7 @@
         </p:xfrm>
         <a:graphic>
           <a:graphicData uri="http://schemas.openxmlformats.org/drawingml/2006/chart">
-            <c:chart xmlns:c="http://schemas.openxmlformats.org/drawingml/2006/chart" xmlns:r="http://schemas.openxmlformats.org/officeDocument/2006/relationships" r:id="rId5"/>
+            <c:chart xmlns:c="http://schemas.openxmlformats.org/drawingml/2006/chart" xmlns:r="http://schemas.openxmlformats.org/officeDocument/2006/relationships" r:id="rId6"/>
           </a:graphicData>
         </a:graphic>
       </p:graphicFrame>
@@ -17842,7 +17880,7 @@
         </p:xfrm>
         <a:graphic>
           <a:graphicData uri="http://schemas.openxmlformats.org/drawingml/2006/chart">
-            <c:chart xmlns:c="http://schemas.openxmlformats.org/drawingml/2006/chart" xmlns:r="http://schemas.openxmlformats.org/officeDocument/2006/relationships" r:id="rId6"/>
+            <c:chart xmlns:c="http://schemas.openxmlformats.org/drawingml/2006/chart" xmlns:r="http://schemas.openxmlformats.org/officeDocument/2006/relationships" r:id="rId7"/>
           </a:graphicData>
         </a:graphic>
       </p:graphicFrame>
@@ -17872,7 +17910,7 @@
         </p:xfrm>
         <a:graphic>
           <a:graphicData uri="http://schemas.openxmlformats.org/drawingml/2006/chart">
-            <c:chart xmlns:c="http://schemas.openxmlformats.org/drawingml/2006/chart" xmlns:r="http://schemas.openxmlformats.org/officeDocument/2006/relationships" r:id="rId7"/>
+            <c:chart xmlns:c="http://schemas.openxmlformats.org/drawingml/2006/chart" xmlns:r="http://schemas.openxmlformats.org/officeDocument/2006/relationships" r:id="rId8"/>
           </a:graphicData>
         </a:graphic>
       </p:graphicFrame>
@@ -18077,14 +18115,14 @@
           <p:nvPr>
             <p:extLst>
               <p:ext uri="{D42A27DB-BD31-4B8C-83A1-F6EECF244321}">
-                <p14:modId xmlns:p14="http://schemas.microsoft.com/office/powerpoint/2010/main" val="1696501125"/>
+                <p14:modId xmlns:p14="http://schemas.microsoft.com/office/powerpoint/2010/main" val="3312009537"/>
               </p:ext>
             </p:extLst>
           </p:nvPr>
         </p:nvGraphicFramePr>
         <p:xfrm>
           <a:off x="430061" y="1123127"/>
-          <a:ext cx="11353800" cy="4755846"/>
+          <a:ext cx="11353800" cy="4693405"/>
         </p:xfrm>
         <a:graphic>
           <a:graphicData uri="http://schemas.openxmlformats.org/drawingml/2006/table">
@@ -18114,14 +18152,14 @@
                     </a:ext>
                   </a:extLst>
                 </a:gridCol>
-                <a:gridCol w="1766170">
+                <a:gridCol w="1476328">
                   <a:extLst>
                     <a:ext uri="{9D8B030D-6E8A-4147-A177-3AD203B41FA5}">
                       <a16:colId xmlns:a16="http://schemas.microsoft.com/office/drawing/2014/main" val="1701199882"/>
                     </a:ext>
                   </a:extLst>
                 </a:gridCol>
-                <a:gridCol w="1177446">
+                <a:gridCol w="1467288">
                   <a:extLst>
                     <a:ext uri="{9D8B030D-6E8A-4147-A177-3AD203B41FA5}">
                       <a16:colId xmlns:a16="http://schemas.microsoft.com/office/drawing/2014/main" val="2293308806"/>
@@ -18175,22 +18213,18 @@
                     <a:p>
                       <a:pPr algn="l" fontAlgn="b"/>
                       <a:r>
-                        <a:rPr lang="fr-BE" sz="1600" u="none" strike="noStrike" dirty="0">
+                        <a:rPr lang="fr-BE" sz="1600" b="0" i="0" u="none" strike="noStrike" dirty="0">
+                          <a:solidFill>
+                            <a:srgbClr val="000000"/>
+                          </a:solidFill>
                           <a:effectLst/>
                           <a:latin typeface="Aptos" panose="020B0004020202020204" pitchFamily="34" charset="0"/>
                         </a:rPr>
                         <a:t>Température</a:t>
                       </a:r>
-                      <a:endParaRPr lang="fr-BE" sz="1600" b="0" i="0" u="none" strike="noStrike" dirty="0">
-                        <a:solidFill>
-                          <a:srgbClr val="000000"/>
-                        </a:solidFill>
-                        <a:effectLst/>
-                        <a:latin typeface="Aptos" panose="020B0004020202020204" pitchFamily="34" charset="0"/>
-                      </a:endParaRPr>
-                    </a:p>
-                  </a:txBody>
-                  <a:tcPr marL="6761" marR="6761" marT="6761" marB="0" anchor="b"/>
+                    </a:p>
+                  </a:txBody>
+                  <a:tcPr marL="9525" marR="9525" marT="9525" marB="0" anchor="b"/>
                 </a:tc>
                 <a:tc>
                   <a:txBody>
@@ -18199,22 +18233,18 @@
                     <a:p>
                       <a:pPr algn="l" fontAlgn="b"/>
                       <a:r>
-                        <a:rPr lang="fr-BE" sz="1600" u="none" strike="noStrike">
+                        <a:rPr lang="fr-BE" sz="1600" b="0" i="0" u="none" strike="noStrike">
+                          <a:solidFill>
+                            <a:srgbClr val="000000"/>
+                          </a:solidFill>
                           <a:effectLst/>
                           <a:latin typeface="Aptos" panose="020B0004020202020204" pitchFamily="34" charset="0"/>
                         </a:rPr>
                         <a:t>Mousse</a:t>
                       </a:r>
-                      <a:endParaRPr lang="fr-BE" sz="1600" b="0" i="0" u="none" strike="noStrike">
-                        <a:solidFill>
-                          <a:srgbClr val="000000"/>
-                        </a:solidFill>
-                        <a:effectLst/>
-                        <a:latin typeface="Aptos" panose="020B0004020202020204" pitchFamily="34" charset="0"/>
-                      </a:endParaRPr>
-                    </a:p>
-                  </a:txBody>
-                  <a:tcPr marL="6761" marR="6761" marT="6761" marB="0" anchor="b"/>
+                    </a:p>
+                  </a:txBody>
+                  <a:tcPr marL="9525" marR="9525" marT="9525" marB="0" anchor="b"/>
                 </a:tc>
                 <a:tc>
                   <a:txBody>
@@ -18223,22 +18253,18 @@
                     <a:p>
                       <a:pPr algn="l" fontAlgn="b"/>
                       <a:r>
-                        <a:rPr lang="fr-BE" sz="1600" u="none" strike="noStrike" dirty="0">
+                        <a:rPr lang="fr-BE" sz="1600" b="0" i="0" u="none" strike="noStrike">
+                          <a:solidFill>
+                            <a:srgbClr val="000000"/>
+                          </a:solidFill>
                           <a:effectLst/>
                           <a:latin typeface="Aptos" panose="020B0004020202020204" pitchFamily="34" charset="0"/>
                         </a:rPr>
                         <a:t>Bruit et vibration</a:t>
                       </a:r>
-                      <a:endParaRPr lang="fr-BE" sz="1600" b="0" i="0" u="none" strike="noStrike" dirty="0">
-                        <a:solidFill>
-                          <a:srgbClr val="000000"/>
-                        </a:solidFill>
-                        <a:effectLst/>
-                        <a:latin typeface="Aptos" panose="020B0004020202020204" pitchFamily="34" charset="0"/>
-                      </a:endParaRPr>
-                    </a:p>
-                  </a:txBody>
-                  <a:tcPr marL="6761" marR="6761" marT="6761" marB="0" anchor="b"/>
+                    </a:p>
+                  </a:txBody>
+                  <a:tcPr marL="9525" marR="9525" marT="9525" marB="0" anchor="b"/>
                 </a:tc>
                 <a:tc>
                   <a:txBody>
@@ -18247,22 +18273,18 @@
                     <a:p>
                       <a:pPr algn="l" fontAlgn="b"/>
                       <a:r>
-                        <a:rPr lang="fr-BE" sz="1600" u="none" strike="noStrike">
+                        <a:rPr lang="fr-BE" sz="1600" b="0" i="0" u="none" strike="noStrike">
+                          <a:solidFill>
+                            <a:srgbClr val="000000"/>
+                          </a:solidFill>
                           <a:effectLst/>
                           <a:latin typeface="Aptos" panose="020B0004020202020204" pitchFamily="34" charset="0"/>
                         </a:rPr>
                         <a:t>Capacité eau</a:t>
                       </a:r>
-                      <a:endParaRPr lang="fr-BE" sz="1600" b="0" i="0" u="none" strike="noStrike">
-                        <a:solidFill>
-                          <a:srgbClr val="000000"/>
-                        </a:solidFill>
-                        <a:effectLst/>
-                        <a:latin typeface="Aptos" panose="020B0004020202020204" pitchFamily="34" charset="0"/>
-                      </a:endParaRPr>
-                    </a:p>
-                  </a:txBody>
-                  <a:tcPr marL="6761" marR="6761" marT="6761" marB="0" anchor="b"/>
+                    </a:p>
+                  </a:txBody>
+                  <a:tcPr marL="9525" marR="9525" marT="9525" marB="0" anchor="b"/>
                 </a:tc>
                 <a:tc>
                   <a:txBody>
@@ -18271,22 +18293,18 @@
                     <a:p>
                       <a:pPr algn="l" fontAlgn="b"/>
                       <a:r>
-                        <a:rPr lang="fr-BE" sz="1600" u="none" strike="noStrike" dirty="0">
+                        <a:rPr lang="fr-BE" sz="1600" b="0" i="0" u="none" strike="noStrike" dirty="0">
+                          <a:solidFill>
+                            <a:srgbClr val="000000"/>
+                          </a:solidFill>
                           <a:effectLst/>
                           <a:latin typeface="Aptos" panose="020B0004020202020204" pitchFamily="34" charset="0"/>
                         </a:rPr>
                         <a:t>Prix</a:t>
                       </a:r>
-                      <a:endParaRPr lang="fr-BE" sz="1600" b="0" i="0" u="none" strike="noStrike" dirty="0">
-                        <a:solidFill>
-                          <a:srgbClr val="000000"/>
-                        </a:solidFill>
-                        <a:effectLst/>
-                        <a:latin typeface="Aptos" panose="020B0004020202020204" pitchFamily="34" charset="0"/>
-                      </a:endParaRPr>
-                    </a:p>
-                  </a:txBody>
-                  <a:tcPr marL="6761" marR="6761" marT="6761" marB="0" anchor="b"/>
+                    </a:p>
+                  </a:txBody>
+                  <a:tcPr marL="9525" marR="9525" marT="9525" marB="0" anchor="b"/>
                 </a:tc>
                 <a:tc>
                   <a:txBody>
@@ -18295,18 +18313,18 @@
                     <a:p>
                       <a:pPr algn="l" fontAlgn="b"/>
                       <a:r>
-                        <a:rPr lang="fr-BE" sz="1600" b="0" i="0" u="none" strike="noStrike">
-                          <a:solidFill>
-                            <a:srgbClr val="000000"/>
-                          </a:solidFill>
-                          <a:effectLst/>
-                          <a:latin typeface="Aptos Narrow" panose="020B0004020202020204" pitchFamily="34" charset="0"/>
+                        <a:rPr lang="fr-BE" sz="1600" b="0" i="0" u="none" strike="noStrike" dirty="0">
+                          <a:solidFill>
+                            <a:srgbClr val="000000"/>
+                          </a:solidFill>
+                          <a:effectLst/>
+                          <a:latin typeface="Aptos" panose="020B0004020202020204" pitchFamily="34" charset="0"/>
                         </a:rPr>
                         <a:t>Utilité Additive</a:t>
                       </a:r>
                     </a:p>
                   </a:txBody>
-                  <a:tcPr marL="7620" marR="7620" marT="7620" marB="0" anchor="b"/>
+                  <a:tcPr marL="9525" marR="9525" marT="9525" marB="0" anchor="b"/>
                 </a:tc>
                 <a:tc>
                   <a:txBody>
@@ -18315,18 +18333,18 @@
                     <a:p>
                       <a:pPr algn="l" fontAlgn="b"/>
                       <a:r>
-                        <a:rPr lang="fr-BE" sz="1600" b="0" i="0" u="none" strike="noStrike">
-                          <a:solidFill>
-                            <a:srgbClr val="000000"/>
-                          </a:solidFill>
-                          <a:effectLst/>
-                          <a:latin typeface="Aptos Narrow" panose="020B0004020202020204" pitchFamily="34" charset="0"/>
+                        <a:rPr lang="fr-BE" sz="1600" b="0" i="0" u="none" strike="noStrike" dirty="0">
+                          <a:solidFill>
+                            <a:srgbClr val="000000"/>
+                          </a:solidFill>
+                          <a:effectLst/>
+                          <a:latin typeface="Aptos" panose="020B0004020202020204" pitchFamily="34" charset="0"/>
                         </a:rPr>
                         <a:t>Rang</a:t>
                       </a:r>
                     </a:p>
                   </a:txBody>
-                  <a:tcPr marL="7620" marR="7620" marT="7620" marB="0" anchor="b"/>
+                  <a:tcPr marL="9525" marR="9525" marT="9525" marB="0" anchor="b"/>
                 </a:tc>
                 <a:extLst>
                   <a:ext uri="{0D108BD9-81ED-4DB2-BD59-A6C34878D82A}">
@@ -18366,158 +18384,138 @@
                     <a:p>
                       <a:pPr algn="r" fontAlgn="b"/>
                       <a:r>
-                        <a:rPr lang="fr-BE" sz="1600" u="none" strike="noStrike" dirty="0">
+                        <a:rPr lang="fr-BE" sz="1600" b="0" i="0" u="none" strike="noStrike" dirty="0">
+                          <a:solidFill>
+                            <a:srgbClr val="000000"/>
+                          </a:solidFill>
                           <a:effectLst/>
                           <a:latin typeface="Aptos" panose="020B0004020202020204" pitchFamily="34" charset="0"/>
                         </a:rPr>
                         <a:t>80</a:t>
                       </a:r>
-                      <a:endParaRPr lang="fr-BE" sz="1600" b="0" i="0" u="none" strike="noStrike" dirty="0">
-                        <a:solidFill>
-                          <a:srgbClr val="000000"/>
-                        </a:solidFill>
-                        <a:effectLst/>
-                        <a:latin typeface="Aptos" panose="020B0004020202020204" pitchFamily="34" charset="0"/>
-                      </a:endParaRPr>
-                    </a:p>
-                  </a:txBody>
-                  <a:tcPr marL="6761" marR="6761" marT="6761" marB="0" anchor="b"/>
-                </a:tc>
-                <a:tc>
-                  <a:txBody>
-                    <a:bodyPr/>
-                    <a:lstStyle/>
-                    <a:p>
-                      <a:pPr algn="r" fontAlgn="b"/>
-                      <a:r>
-                        <a:rPr lang="fr-BE" sz="1600" u="none" strike="noStrike" dirty="0">
+                    </a:p>
+                  </a:txBody>
+                  <a:tcPr marL="9525" marR="9525" marT="9525" marB="0" anchor="b"/>
+                </a:tc>
+                <a:tc>
+                  <a:txBody>
+                    <a:bodyPr/>
+                    <a:lstStyle/>
+                    <a:p>
+                      <a:pPr algn="r" fontAlgn="b"/>
+                      <a:r>
+                        <a:rPr lang="fr-BE" sz="1600" b="0" i="0" u="none" strike="noStrike" dirty="0">
+                          <a:solidFill>
+                            <a:srgbClr val="000000"/>
+                          </a:solidFill>
                           <a:effectLst/>
                           <a:latin typeface="Aptos" panose="020B0004020202020204" pitchFamily="34" charset="0"/>
                         </a:rPr>
                         <a:t>80</a:t>
                       </a:r>
-                      <a:endParaRPr lang="fr-BE" sz="1600" b="0" i="0" u="none" strike="noStrike" dirty="0">
-                        <a:solidFill>
-                          <a:srgbClr val="000000"/>
-                        </a:solidFill>
-                        <a:effectLst/>
-                        <a:latin typeface="Aptos" panose="020B0004020202020204" pitchFamily="34" charset="0"/>
-                      </a:endParaRPr>
-                    </a:p>
-                  </a:txBody>
-                  <a:tcPr marL="6761" marR="6761" marT="6761" marB="0" anchor="b"/>
-                </a:tc>
-                <a:tc>
-                  <a:txBody>
-                    <a:bodyPr/>
-                    <a:lstStyle/>
-                    <a:p>
-                      <a:pPr algn="r" fontAlgn="b"/>
-                      <a:r>
-                        <a:rPr lang="fr-BE" sz="1600" u="none" strike="noStrike">
+                    </a:p>
+                  </a:txBody>
+                  <a:tcPr marL="9525" marR="9525" marT="9525" marB="0" anchor="b"/>
+                </a:tc>
+                <a:tc>
+                  <a:txBody>
+                    <a:bodyPr/>
+                    <a:lstStyle/>
+                    <a:p>
+                      <a:pPr algn="r" fontAlgn="b"/>
+                      <a:r>
+                        <a:rPr lang="fr-BE" sz="1600" b="0" i="0" u="none" strike="noStrike">
+                          <a:solidFill>
+                            <a:srgbClr val="000000"/>
+                          </a:solidFill>
                           <a:effectLst/>
                           <a:latin typeface="Aptos" panose="020B0004020202020204" pitchFamily="34" charset="0"/>
                         </a:rPr>
                         <a:t>100</a:t>
                       </a:r>
-                      <a:endParaRPr lang="fr-BE" sz="1600" b="0" i="0" u="none" strike="noStrike">
-                        <a:solidFill>
-                          <a:srgbClr val="000000"/>
-                        </a:solidFill>
-                        <a:effectLst/>
-                        <a:latin typeface="Aptos" panose="020B0004020202020204" pitchFamily="34" charset="0"/>
-                      </a:endParaRPr>
-                    </a:p>
-                  </a:txBody>
-                  <a:tcPr marL="6761" marR="6761" marT="6761" marB="0" anchor="b"/>
-                </a:tc>
-                <a:tc>
-                  <a:txBody>
-                    <a:bodyPr/>
-                    <a:lstStyle/>
-                    <a:p>
-                      <a:pPr algn="r" fontAlgn="b"/>
-                      <a:r>
-                        <a:rPr lang="fr-BE" sz="1600" u="none" strike="noStrike" dirty="0">
+                    </a:p>
+                  </a:txBody>
+                  <a:tcPr marL="9525" marR="9525" marT="9525" marB="0" anchor="b"/>
+                </a:tc>
+                <a:tc>
+                  <a:txBody>
+                    <a:bodyPr/>
+                    <a:lstStyle/>
+                    <a:p>
+                      <a:pPr algn="r" fontAlgn="b"/>
+                      <a:r>
+                        <a:rPr lang="fr-BE" sz="1600" b="0" i="0" u="none" strike="noStrike">
+                          <a:solidFill>
+                            <a:srgbClr val="000000"/>
+                          </a:solidFill>
                           <a:effectLst/>
                           <a:latin typeface="Aptos" panose="020B0004020202020204" pitchFamily="34" charset="0"/>
                         </a:rPr>
-                        <a:t>-2,842E-14</a:t>
-                      </a:r>
-                      <a:endParaRPr lang="fr-BE" sz="1600" b="0" i="0" u="none" strike="noStrike" dirty="0">
-                        <a:solidFill>
-                          <a:srgbClr val="000000"/>
-                        </a:solidFill>
-                        <a:effectLst/>
-                        <a:latin typeface="Aptos" panose="020B0004020202020204" pitchFamily="34" charset="0"/>
-                      </a:endParaRPr>
-                    </a:p>
-                  </a:txBody>
-                  <a:tcPr marL="6761" marR="6761" marT="6761" marB="0" anchor="b"/>
-                </a:tc>
-                <a:tc>
-                  <a:txBody>
-                    <a:bodyPr/>
-                    <a:lstStyle/>
-                    <a:p>
-                      <a:pPr algn="r" fontAlgn="b"/>
-                      <a:r>
-                        <a:rPr lang="fr-BE" sz="1600" u="none" strike="noStrike" dirty="0">
+                        <a:t>-2,84217E-14</a:t>
+                      </a:r>
+                    </a:p>
+                  </a:txBody>
+                  <a:tcPr marL="9525" marR="9525" marT="9525" marB="0" anchor="b"/>
+                </a:tc>
+                <a:tc>
+                  <a:txBody>
+                    <a:bodyPr/>
+                    <a:lstStyle/>
+                    <a:p>
+                      <a:pPr algn="r" fontAlgn="b"/>
+                      <a:r>
+                        <a:rPr lang="fr-BE" sz="1600" b="0" i="0" u="none" strike="noStrike">
+                          <a:solidFill>
+                            <a:srgbClr val="000000"/>
+                          </a:solidFill>
                           <a:effectLst/>
                           <a:latin typeface="Aptos" panose="020B0004020202020204" pitchFamily="34" charset="0"/>
                         </a:rPr>
                         <a:t>100</a:t>
                       </a:r>
-                      <a:endParaRPr lang="fr-BE" sz="1600" b="0" i="0" u="none" strike="noStrike" dirty="0">
-                        <a:solidFill>
-                          <a:srgbClr val="000000"/>
-                        </a:solidFill>
-                        <a:effectLst/>
-                        <a:latin typeface="Aptos" panose="020B0004020202020204" pitchFamily="34" charset="0"/>
-                      </a:endParaRPr>
-                    </a:p>
-                  </a:txBody>
-                  <a:tcPr marL="6761" marR="6761" marT="6761" marB="0" anchor="b"/>
-                </a:tc>
-                <a:tc>
-                  <a:txBody>
-                    <a:bodyPr/>
-                    <a:lstStyle/>
-                    <a:p>
-                      <a:pPr algn="r" fontAlgn="b"/>
-                      <a:r>
-                        <a:rPr lang="fr-BE" sz="1600" b="0" i="0" u="none" strike="noStrike">
-                          <a:solidFill>
-                            <a:srgbClr val="000000"/>
-                          </a:solidFill>
-                          <a:effectLst/>
-                          <a:latin typeface="Aptos Narrow" panose="020B0004020202020204" pitchFamily="34" charset="0"/>
-                        </a:rPr>
-                        <a:t>70,899646</a:t>
-                      </a:r>
-                    </a:p>
-                  </a:txBody>
-                  <a:tcPr marL="7620" marR="7620" marT="7620" marB="0" anchor="b"/>
-                </a:tc>
-                <a:tc>
-                  <a:txBody>
-                    <a:bodyPr/>
-                    <a:lstStyle/>
-                    <a:p>
-                      <a:pPr algn="r" fontAlgn="b"/>
-                      <a:r>
-                        <a:rPr lang="fr-BE" sz="1600" b="0" i="0" u="none" strike="noStrike">
-                          <a:solidFill>
-                            <a:srgbClr val="000000"/>
-                          </a:solidFill>
-                          <a:effectLst/>
-                          <a:latin typeface="Aptos Narrow" panose="020B0004020202020204" pitchFamily="34" charset="0"/>
+                    </a:p>
+                  </a:txBody>
+                  <a:tcPr marL="9525" marR="9525" marT="9525" marB="0" anchor="b"/>
+                </a:tc>
+                <a:tc>
+                  <a:txBody>
+                    <a:bodyPr/>
+                    <a:lstStyle/>
+                    <a:p>
+                      <a:pPr algn="r" fontAlgn="b"/>
+                      <a:r>
+                        <a:rPr lang="fr-BE" sz="1600" b="0" i="0" u="none" strike="noStrike" dirty="0">
+                          <a:solidFill>
+                            <a:srgbClr val="000000"/>
+                          </a:solidFill>
+                          <a:effectLst/>
+                          <a:latin typeface="Aptos" panose="020B0004020202020204" pitchFamily="34" charset="0"/>
+                        </a:rPr>
+                        <a:t>80,9431655</a:t>
+                      </a:r>
+                    </a:p>
+                  </a:txBody>
+                  <a:tcPr marL="9525" marR="9525" marT="9525" marB="0" anchor="b"/>
+                </a:tc>
+                <a:tc>
+                  <a:txBody>
+                    <a:bodyPr/>
+                    <a:lstStyle/>
+                    <a:p>
+                      <a:pPr algn="r" fontAlgn="b"/>
+                      <a:r>
+                        <a:rPr lang="fr-BE" sz="1600" b="0" i="0" u="none" strike="noStrike" dirty="0">
+                          <a:solidFill>
+                            <a:srgbClr val="000000"/>
+                          </a:solidFill>
+                          <a:effectLst/>
+                          <a:latin typeface="Aptos" panose="020B0004020202020204" pitchFamily="34" charset="0"/>
                         </a:rPr>
                         <a:t>1</a:t>
                       </a:r>
                     </a:p>
                   </a:txBody>
-                  <a:tcPr marL="7620" marR="7620" marT="7620" marB="0" anchor="b"/>
+                  <a:tcPr marL="9525" marR="9525" marT="9525" marB="0" anchor="b"/>
                 </a:tc>
                 <a:extLst>
                   <a:ext uri="{0D108BD9-81ED-4DB2-BD59-A6C34878D82A}">
@@ -18557,118 +18555,118 @@
                     <a:p>
                       <a:pPr algn="r" fontAlgn="b"/>
                       <a:r>
-                        <a:rPr lang="fr-BE" sz="1600" u="none" strike="noStrike">
+                        <a:rPr lang="fr-BE" sz="1600" b="0" i="0" u="none" strike="noStrike">
+                          <a:solidFill>
+                            <a:srgbClr val="000000"/>
+                          </a:solidFill>
                           <a:effectLst/>
                           <a:latin typeface="Aptos" panose="020B0004020202020204" pitchFamily="34" charset="0"/>
                         </a:rPr>
                         <a:t>100</a:t>
                       </a:r>
-                      <a:endParaRPr lang="fr-BE" sz="1600" b="0" i="0" u="none" strike="noStrike">
-                        <a:solidFill>
-                          <a:srgbClr val="000000"/>
-                        </a:solidFill>
-                        <a:effectLst/>
-                        <a:latin typeface="Aptos" panose="020B0004020202020204" pitchFamily="34" charset="0"/>
-                      </a:endParaRPr>
-                    </a:p>
-                  </a:txBody>
-                  <a:tcPr marL="6761" marR="6761" marT="6761" marB="0" anchor="b"/>
-                </a:tc>
-                <a:tc>
-                  <a:txBody>
-                    <a:bodyPr/>
-                    <a:lstStyle/>
-                    <a:p>
-                      <a:pPr algn="r" fontAlgn="b"/>
-                      <a:r>
-                        <a:rPr lang="fr-BE" sz="1600" u="none" strike="noStrike" dirty="0">
+                    </a:p>
+                  </a:txBody>
+                  <a:tcPr marL="9525" marR="9525" marT="9525" marB="0" anchor="b"/>
+                </a:tc>
+                <a:tc>
+                  <a:txBody>
+                    <a:bodyPr/>
+                    <a:lstStyle/>
+                    <a:p>
+                      <a:pPr algn="r" fontAlgn="b"/>
+                      <a:r>
+                        <a:rPr lang="fr-BE" sz="1600" b="0" i="0" u="none" strike="noStrike" dirty="0">
+                          <a:solidFill>
+                            <a:srgbClr val="000000"/>
+                          </a:solidFill>
                           <a:effectLst/>
                           <a:latin typeface="Aptos" panose="020B0004020202020204" pitchFamily="34" charset="0"/>
                         </a:rPr>
                         <a:t>80</a:t>
                       </a:r>
-                      <a:endParaRPr lang="fr-BE" sz="1600" b="0" i="0" u="none" strike="noStrike" dirty="0">
-                        <a:solidFill>
-                          <a:srgbClr val="000000"/>
-                        </a:solidFill>
-                        <a:effectLst/>
-                        <a:latin typeface="Aptos" panose="020B0004020202020204" pitchFamily="34" charset="0"/>
-                      </a:endParaRPr>
-                    </a:p>
-                  </a:txBody>
-                  <a:tcPr marL="6761" marR="6761" marT="6761" marB="0" anchor="b"/>
-                </a:tc>
-                <a:tc>
-                  <a:txBody>
-                    <a:bodyPr/>
-                    <a:lstStyle/>
-                    <a:p>
-                      <a:pPr algn="r" fontAlgn="b"/>
-                      <a:r>
-                        <a:rPr lang="fr-BE" sz="1600" u="none" strike="noStrike" dirty="0">
+                    </a:p>
+                  </a:txBody>
+                  <a:tcPr marL="9525" marR="9525" marT="9525" marB="0" anchor="b"/>
+                </a:tc>
+                <a:tc>
+                  <a:txBody>
+                    <a:bodyPr/>
+                    <a:lstStyle/>
+                    <a:p>
+                      <a:pPr algn="r" fontAlgn="b"/>
+                      <a:r>
+                        <a:rPr lang="fr-BE" sz="1600" b="0" i="0" u="none" strike="noStrike" dirty="0">
+                          <a:solidFill>
+                            <a:srgbClr val="000000"/>
+                          </a:solidFill>
                           <a:effectLst/>
                           <a:latin typeface="Aptos" panose="020B0004020202020204" pitchFamily="34" charset="0"/>
                         </a:rPr>
                         <a:t>60</a:t>
                       </a:r>
-                      <a:endParaRPr lang="fr-BE" sz="1600" b="0" i="0" u="none" strike="noStrike" dirty="0">
-                        <a:solidFill>
-                          <a:srgbClr val="000000"/>
-                        </a:solidFill>
-                        <a:effectLst/>
-                        <a:latin typeface="Aptos" panose="020B0004020202020204" pitchFamily="34" charset="0"/>
-                      </a:endParaRPr>
-                    </a:p>
-                  </a:txBody>
-                  <a:tcPr marL="6761" marR="6761" marT="6761" marB="0" anchor="b"/>
-                </a:tc>
-                <a:tc>
-                  <a:txBody>
-                    <a:bodyPr/>
-                    <a:lstStyle/>
-                    <a:p>
-                      <a:pPr algn="r" fontAlgn="b"/>
-                      <a:r>
-                        <a:rPr lang="fr-BE" sz="1600" u="none" strike="noStrike">
+                    </a:p>
+                  </a:txBody>
+                  <a:tcPr marL="9525" marR="9525" marT="9525" marB="0" anchor="b"/>
+                </a:tc>
+                <a:tc>
+                  <a:txBody>
+                    <a:bodyPr/>
+                    <a:lstStyle/>
+                    <a:p>
+                      <a:pPr algn="r" fontAlgn="b"/>
+                      <a:r>
+                        <a:rPr lang="fr-BE" sz="1600" b="0" i="0" u="none" strike="noStrike">
+                          <a:solidFill>
+                            <a:srgbClr val="000000"/>
+                          </a:solidFill>
                           <a:effectLst/>
                           <a:latin typeface="Aptos" panose="020B0004020202020204" pitchFamily="34" charset="0"/>
                         </a:rPr>
-                        <a:t>-2,842E-14</a:t>
-                      </a:r>
-                      <a:endParaRPr lang="fr-BE" sz="1600" b="0" i="0" u="none" strike="noStrike">
-                        <a:solidFill>
-                          <a:srgbClr val="000000"/>
-                        </a:solidFill>
-                        <a:effectLst/>
-                        <a:latin typeface="Aptos" panose="020B0004020202020204" pitchFamily="34" charset="0"/>
-                      </a:endParaRPr>
-                    </a:p>
-                  </a:txBody>
-                  <a:tcPr marL="6761" marR="6761" marT="6761" marB="0" anchor="b"/>
-                </a:tc>
-                <a:tc>
-                  <a:txBody>
-                    <a:bodyPr/>
-                    <a:lstStyle/>
-                    <a:p>
-                      <a:pPr algn="r" fontAlgn="b"/>
-                      <a:r>
-                        <a:rPr lang="fr-BE" sz="1600" u="none" strike="noStrike" dirty="0">
+                        <a:t>-2,84217E-14</a:t>
+                      </a:r>
+                    </a:p>
+                  </a:txBody>
+                  <a:tcPr marL="9525" marR="9525" marT="9525" marB="0" anchor="b"/>
+                </a:tc>
+                <a:tc>
+                  <a:txBody>
+                    <a:bodyPr/>
+                    <a:lstStyle/>
+                    <a:p>
+                      <a:pPr algn="r" fontAlgn="b"/>
+                      <a:r>
+                        <a:rPr lang="fr-BE" sz="1600" b="0" i="0" u="none" strike="noStrike">
+                          <a:solidFill>
+                            <a:srgbClr val="000000"/>
+                          </a:solidFill>
                           <a:effectLst/>
                           <a:latin typeface="Aptos" panose="020B0004020202020204" pitchFamily="34" charset="0"/>
                         </a:rPr>
                         <a:t>72,3751274</a:t>
                       </a:r>
-                      <a:endParaRPr lang="fr-BE" sz="1600" b="0" i="0" u="none" strike="noStrike" dirty="0">
-                        <a:solidFill>
-                          <a:srgbClr val="000000"/>
-                        </a:solidFill>
-                        <a:effectLst/>
-                        <a:latin typeface="Aptos" panose="020B0004020202020204" pitchFamily="34" charset="0"/>
-                      </a:endParaRPr>
-                    </a:p>
-                  </a:txBody>
-                  <a:tcPr marL="6761" marR="6761" marT="6761" marB="0" anchor="b"/>
+                    </a:p>
+                  </a:txBody>
+                  <a:tcPr marL="9525" marR="9525" marT="9525" marB="0" anchor="b"/>
+                </a:tc>
+                <a:tc>
+                  <a:txBody>
+                    <a:bodyPr/>
+                    <a:lstStyle/>
+                    <a:p>
+                      <a:pPr algn="r" fontAlgn="b"/>
+                      <a:r>
+                        <a:rPr lang="fr-BE" sz="1600" b="0" i="0" u="none" strike="noStrike">
+                          <a:solidFill>
+                            <a:srgbClr val="000000"/>
+                          </a:solidFill>
+                          <a:effectLst/>
+                          <a:latin typeface="Aptos" panose="020B0004020202020204" pitchFamily="34" charset="0"/>
+                        </a:rPr>
+                        <a:t>58,2068985</a:t>
+                      </a:r>
+                    </a:p>
+                  </a:txBody>
+                  <a:tcPr marL="9525" marR="9525" marT="9525" marB="0" anchor="b"/>
                 </a:tc>
                 <a:tc>
                   <a:txBody>
@@ -18682,33 +18680,13 @@
                             <a:srgbClr val="000000"/>
                           </a:solidFill>
                           <a:effectLst/>
-                          <a:latin typeface="Aptos Narrow" panose="020B0004020202020204" pitchFamily="34" charset="0"/>
-                        </a:rPr>
-                        <a:t>50,7398196</a:t>
-                      </a:r>
-                    </a:p>
-                  </a:txBody>
-                  <a:tcPr marL="7620" marR="7620" marT="7620" marB="0" anchor="b"/>
-                </a:tc>
-                <a:tc>
-                  <a:txBody>
-                    <a:bodyPr/>
-                    <a:lstStyle/>
-                    <a:p>
-                      <a:pPr algn="r" fontAlgn="b"/>
-                      <a:r>
-                        <a:rPr lang="fr-BE" sz="1600" b="0" i="0" u="none" strike="noStrike">
-                          <a:solidFill>
-                            <a:srgbClr val="000000"/>
-                          </a:solidFill>
-                          <a:effectLst/>
-                          <a:latin typeface="Aptos Narrow" panose="020B0004020202020204" pitchFamily="34" charset="0"/>
-                        </a:rPr>
-                        <a:t>5</a:t>
-                      </a:r>
-                    </a:p>
-                  </a:txBody>
-                  <a:tcPr marL="7620" marR="7620" marT="7620" marB="0" anchor="b"/>
+                          <a:latin typeface="Aptos" panose="020B0004020202020204" pitchFamily="34" charset="0"/>
+                        </a:rPr>
+                        <a:t>6</a:t>
+                      </a:r>
+                    </a:p>
+                  </a:txBody>
+                  <a:tcPr marL="9525" marR="9525" marT="9525" marB="0" anchor="b"/>
                 </a:tc>
                 <a:extLst>
                   <a:ext uri="{0D108BD9-81ED-4DB2-BD59-A6C34878D82A}">
@@ -18748,118 +18726,98 @@
                     <a:p>
                       <a:pPr algn="r" fontAlgn="b"/>
                       <a:r>
-                        <a:rPr lang="fr-BE" sz="1600" u="none" strike="noStrike">
+                        <a:rPr lang="fr-BE" sz="1600" b="0" i="0" u="none" strike="noStrike">
+                          <a:solidFill>
+                            <a:srgbClr val="000000"/>
+                          </a:solidFill>
                           <a:effectLst/>
                           <a:latin typeface="Aptos" panose="020B0004020202020204" pitchFamily="34" charset="0"/>
                         </a:rPr>
                         <a:t>100</a:t>
                       </a:r>
-                      <a:endParaRPr lang="fr-BE" sz="1600" b="0" i="0" u="none" strike="noStrike">
-                        <a:solidFill>
-                          <a:srgbClr val="000000"/>
-                        </a:solidFill>
-                        <a:effectLst/>
-                        <a:latin typeface="Aptos" panose="020B0004020202020204" pitchFamily="34" charset="0"/>
-                      </a:endParaRPr>
-                    </a:p>
-                  </a:txBody>
-                  <a:tcPr marL="6761" marR="6761" marT="6761" marB="0" anchor="b"/>
-                </a:tc>
-                <a:tc>
-                  <a:txBody>
-                    <a:bodyPr/>
-                    <a:lstStyle/>
-                    <a:p>
-                      <a:pPr algn="r" fontAlgn="b"/>
-                      <a:r>
-                        <a:rPr lang="fr-BE" sz="1600" u="none" strike="noStrike">
+                    </a:p>
+                  </a:txBody>
+                  <a:tcPr marL="9525" marR="9525" marT="9525" marB="0" anchor="b"/>
+                </a:tc>
+                <a:tc>
+                  <a:txBody>
+                    <a:bodyPr/>
+                    <a:lstStyle/>
+                    <a:p>
+                      <a:pPr algn="r" fontAlgn="b"/>
+                      <a:r>
+                        <a:rPr lang="fr-BE" sz="1600" b="0" i="0" u="none" strike="noStrike">
+                          <a:solidFill>
+                            <a:srgbClr val="000000"/>
+                          </a:solidFill>
                           <a:effectLst/>
                           <a:latin typeface="Aptos" panose="020B0004020202020204" pitchFamily="34" charset="0"/>
                         </a:rPr>
                         <a:t>80</a:t>
                       </a:r>
-                      <a:endParaRPr lang="fr-BE" sz="1600" b="0" i="0" u="none" strike="noStrike">
-                        <a:solidFill>
-                          <a:srgbClr val="000000"/>
-                        </a:solidFill>
-                        <a:effectLst/>
-                        <a:latin typeface="Aptos" panose="020B0004020202020204" pitchFamily="34" charset="0"/>
-                      </a:endParaRPr>
-                    </a:p>
-                  </a:txBody>
-                  <a:tcPr marL="6761" marR="6761" marT="6761" marB="0" anchor="b"/>
-                </a:tc>
-                <a:tc>
-                  <a:txBody>
-                    <a:bodyPr/>
-                    <a:lstStyle/>
-                    <a:p>
-                      <a:pPr algn="r" fontAlgn="b"/>
-                      <a:r>
-                        <a:rPr lang="fr-BE" sz="1600" u="none" strike="noStrike" dirty="0">
+                    </a:p>
+                  </a:txBody>
+                  <a:tcPr marL="9525" marR="9525" marT="9525" marB="0" anchor="b"/>
+                </a:tc>
+                <a:tc>
+                  <a:txBody>
+                    <a:bodyPr/>
+                    <a:lstStyle/>
+                    <a:p>
+                      <a:pPr algn="r" fontAlgn="b"/>
+                      <a:r>
+                        <a:rPr lang="fr-BE" sz="1600" b="0" i="0" u="none" strike="noStrike" dirty="0">
+                          <a:solidFill>
+                            <a:srgbClr val="000000"/>
+                          </a:solidFill>
                           <a:effectLst/>
                           <a:latin typeface="Aptos" panose="020B0004020202020204" pitchFamily="34" charset="0"/>
                         </a:rPr>
                         <a:t>40</a:t>
                       </a:r>
-                      <a:endParaRPr lang="fr-BE" sz="1600" b="0" i="0" u="none" strike="noStrike" dirty="0">
-                        <a:solidFill>
-                          <a:srgbClr val="000000"/>
-                        </a:solidFill>
-                        <a:effectLst/>
-                        <a:latin typeface="Aptos" panose="020B0004020202020204" pitchFamily="34" charset="0"/>
-                      </a:endParaRPr>
-                    </a:p>
-                  </a:txBody>
-                  <a:tcPr marL="6761" marR="6761" marT="6761" marB="0" anchor="b"/>
-                </a:tc>
-                <a:tc>
-                  <a:txBody>
-                    <a:bodyPr/>
-                    <a:lstStyle/>
-                    <a:p>
-                      <a:pPr algn="r" fontAlgn="b"/>
-                      <a:r>
-                        <a:rPr lang="fr-BE" sz="1600" u="none" strike="noStrike">
+                    </a:p>
+                  </a:txBody>
+                  <a:tcPr marL="9525" marR="9525" marT="9525" marB="0" anchor="b"/>
+                </a:tc>
+                <a:tc>
+                  <a:txBody>
+                    <a:bodyPr/>
+                    <a:lstStyle/>
+                    <a:p>
+                      <a:pPr algn="r" fontAlgn="b"/>
+                      <a:r>
+                        <a:rPr lang="fr-BE" sz="1600" b="0" i="0" u="none" strike="noStrike">
+                          <a:solidFill>
+                            <a:srgbClr val="000000"/>
+                          </a:solidFill>
                           <a:effectLst/>
                           <a:latin typeface="Aptos" panose="020B0004020202020204" pitchFamily="34" charset="0"/>
                         </a:rPr>
-                        <a:t>88,8888889</a:t>
-                      </a:r>
-                      <a:endParaRPr lang="fr-BE" sz="1600" b="0" i="0" u="none" strike="noStrike">
-                        <a:solidFill>
-                          <a:srgbClr val="000000"/>
-                        </a:solidFill>
-                        <a:effectLst/>
-                        <a:latin typeface="Aptos" panose="020B0004020202020204" pitchFamily="34" charset="0"/>
-                      </a:endParaRPr>
-                    </a:p>
-                  </a:txBody>
-                  <a:tcPr marL="6761" marR="6761" marT="6761" marB="0" anchor="b"/>
-                </a:tc>
-                <a:tc>
-                  <a:txBody>
-                    <a:bodyPr/>
-                    <a:lstStyle/>
-                    <a:p>
-                      <a:pPr algn="r" fontAlgn="b"/>
-                      <a:r>
-                        <a:rPr lang="fr-BE" sz="1600" u="none" strike="noStrike" dirty="0">
+                        <a:t>88,88888889</a:t>
+                      </a:r>
+                    </a:p>
+                  </a:txBody>
+                  <a:tcPr marL="9525" marR="9525" marT="9525" marB="0" anchor="b"/>
+                </a:tc>
+                <a:tc>
+                  <a:txBody>
+                    <a:bodyPr/>
+                    <a:lstStyle/>
+                    <a:p>
+                      <a:pPr algn="r" fontAlgn="b"/>
+                      <a:r>
+                        <a:rPr lang="fr-BE" sz="1600" b="0" i="0" u="none" strike="noStrike">
+                          <a:solidFill>
+                            <a:srgbClr val="000000"/>
+                          </a:solidFill>
                           <a:effectLst/>
                           <a:latin typeface="Aptos" panose="020B0004020202020204" pitchFamily="34" charset="0"/>
                         </a:rPr>
                         <a:t>77,5739042</a:t>
                       </a:r>
-                      <a:endParaRPr lang="fr-BE" sz="1600" b="0" i="0" u="none" strike="noStrike" dirty="0">
-                        <a:solidFill>
-                          <a:srgbClr val="000000"/>
-                        </a:solidFill>
-                        <a:effectLst/>
-                        <a:latin typeface="Aptos" panose="020B0004020202020204" pitchFamily="34" charset="0"/>
-                      </a:endParaRPr>
-                    </a:p>
-                  </a:txBody>
-                  <a:tcPr marL="6761" marR="6761" marT="6761" marB="0" anchor="b"/>
+                    </a:p>
+                  </a:txBody>
+                  <a:tcPr marL="9525" marR="9525" marT="9525" marB="0" anchor="b"/>
                 </a:tc>
                 <a:tc>
                   <a:txBody>
@@ -18873,33 +18831,33 @@
                             <a:srgbClr val="000000"/>
                           </a:solidFill>
                           <a:effectLst/>
-                          <a:latin typeface="Aptos Narrow" panose="020B0004020202020204" pitchFamily="34" charset="0"/>
-                        </a:rPr>
-                        <a:t>55,3488698</a:t>
-                      </a:r>
-                    </a:p>
-                  </a:txBody>
-                  <a:tcPr marL="7620" marR="7620" marT="7620" marB="0" anchor="b"/>
-                </a:tc>
-                <a:tc>
-                  <a:txBody>
-                    <a:bodyPr/>
-                    <a:lstStyle/>
-                    <a:p>
-                      <a:pPr algn="r" fontAlgn="b"/>
-                      <a:r>
-                        <a:rPr lang="fr-BE" sz="1600" b="0" i="0" u="none" strike="noStrike">
-                          <a:solidFill>
-                            <a:srgbClr val="000000"/>
-                          </a:solidFill>
-                          <a:effectLst/>
-                          <a:latin typeface="Aptos Narrow" panose="020B0004020202020204" pitchFamily="34" charset="0"/>
-                        </a:rPr>
-                        <a:t>4</a:t>
-                      </a:r>
-                    </a:p>
-                  </a:txBody>
-                  <a:tcPr marL="7620" marR="7620" marT="7620" marB="0" anchor="b"/>
+                          <a:latin typeface="Aptos" panose="020B0004020202020204" pitchFamily="34" charset="0"/>
+                        </a:rPr>
+                        <a:t>63,0194833</a:t>
+                      </a:r>
+                    </a:p>
+                  </a:txBody>
+                  <a:tcPr marL="9525" marR="9525" marT="9525" marB="0" anchor="b"/>
+                </a:tc>
+                <a:tc>
+                  <a:txBody>
+                    <a:bodyPr/>
+                    <a:lstStyle/>
+                    <a:p>
+                      <a:pPr algn="r" fontAlgn="b"/>
+                      <a:r>
+                        <a:rPr lang="fr-BE" sz="1600" b="0" i="0" u="none" strike="noStrike" dirty="0">
+                          <a:solidFill>
+                            <a:srgbClr val="000000"/>
+                          </a:solidFill>
+                          <a:effectLst/>
+                          <a:latin typeface="Aptos" panose="020B0004020202020204" pitchFamily="34" charset="0"/>
+                        </a:rPr>
+                        <a:t>3</a:t>
+                      </a:r>
+                    </a:p>
+                  </a:txBody>
+                  <a:tcPr marL="9525" marR="9525" marT="9525" marB="0" anchor="b"/>
                 </a:tc>
                 <a:extLst>
                   <a:ext uri="{0D108BD9-81ED-4DB2-BD59-A6C34878D82A}">
@@ -18939,118 +18897,98 @@
                     <a:p>
                       <a:pPr algn="r" fontAlgn="b"/>
                       <a:r>
-                        <a:rPr lang="fr-BE" sz="1600" u="none" strike="noStrike">
+                        <a:rPr lang="fr-BE" sz="1600" b="0" i="0" u="none" strike="noStrike">
+                          <a:solidFill>
+                            <a:srgbClr val="000000"/>
+                          </a:solidFill>
                           <a:effectLst/>
                           <a:latin typeface="Aptos" panose="020B0004020202020204" pitchFamily="34" charset="0"/>
                         </a:rPr>
                         <a:t>80</a:t>
                       </a:r>
-                      <a:endParaRPr lang="fr-BE" sz="1600" b="0" i="0" u="none" strike="noStrike">
-                        <a:solidFill>
-                          <a:srgbClr val="000000"/>
-                        </a:solidFill>
-                        <a:effectLst/>
-                        <a:latin typeface="Aptos" panose="020B0004020202020204" pitchFamily="34" charset="0"/>
-                      </a:endParaRPr>
-                    </a:p>
-                  </a:txBody>
-                  <a:tcPr marL="6761" marR="6761" marT="6761" marB="0" anchor="b"/>
-                </a:tc>
-                <a:tc>
-                  <a:txBody>
-                    <a:bodyPr/>
-                    <a:lstStyle/>
-                    <a:p>
-                      <a:pPr algn="r" fontAlgn="b"/>
-                      <a:r>
-                        <a:rPr lang="fr-BE" sz="1600" u="none" strike="noStrike">
+                    </a:p>
+                  </a:txBody>
+                  <a:tcPr marL="9525" marR="9525" marT="9525" marB="0" anchor="b"/>
+                </a:tc>
+                <a:tc>
+                  <a:txBody>
+                    <a:bodyPr/>
+                    <a:lstStyle/>
+                    <a:p>
+                      <a:pPr algn="r" fontAlgn="b"/>
+                      <a:r>
+                        <a:rPr lang="fr-BE" sz="1600" b="0" i="0" u="none" strike="noStrike">
+                          <a:solidFill>
+                            <a:srgbClr val="000000"/>
+                          </a:solidFill>
                           <a:effectLst/>
                           <a:latin typeface="Aptos" panose="020B0004020202020204" pitchFamily="34" charset="0"/>
                         </a:rPr>
                         <a:t>100</a:t>
                       </a:r>
-                      <a:endParaRPr lang="fr-BE" sz="1600" b="0" i="0" u="none" strike="noStrike">
-                        <a:solidFill>
-                          <a:srgbClr val="000000"/>
-                        </a:solidFill>
-                        <a:effectLst/>
-                        <a:latin typeface="Aptos" panose="020B0004020202020204" pitchFamily="34" charset="0"/>
-                      </a:endParaRPr>
-                    </a:p>
-                  </a:txBody>
-                  <a:tcPr marL="6761" marR="6761" marT="6761" marB="0" anchor="b"/>
-                </a:tc>
-                <a:tc>
-                  <a:txBody>
-                    <a:bodyPr/>
-                    <a:lstStyle/>
-                    <a:p>
-                      <a:pPr algn="r" fontAlgn="b"/>
-                      <a:r>
-                        <a:rPr lang="fr-BE" sz="1600" u="none" strike="noStrike" dirty="0">
+                    </a:p>
+                  </a:txBody>
+                  <a:tcPr marL="9525" marR="9525" marT="9525" marB="0" anchor="b"/>
+                </a:tc>
+                <a:tc>
+                  <a:txBody>
+                    <a:bodyPr/>
+                    <a:lstStyle/>
+                    <a:p>
+                      <a:pPr algn="r" fontAlgn="b"/>
+                      <a:r>
+                        <a:rPr lang="fr-BE" sz="1600" b="0" i="0" u="none" strike="noStrike" dirty="0">
+                          <a:solidFill>
+                            <a:srgbClr val="000000"/>
+                          </a:solidFill>
                           <a:effectLst/>
                           <a:latin typeface="Aptos" panose="020B0004020202020204" pitchFamily="34" charset="0"/>
                         </a:rPr>
                         <a:t>40</a:t>
                       </a:r>
-                      <a:endParaRPr lang="fr-BE" sz="1600" b="0" i="0" u="none" strike="noStrike" dirty="0">
-                        <a:solidFill>
-                          <a:srgbClr val="000000"/>
-                        </a:solidFill>
-                        <a:effectLst/>
-                        <a:latin typeface="Aptos" panose="020B0004020202020204" pitchFamily="34" charset="0"/>
-                      </a:endParaRPr>
-                    </a:p>
-                  </a:txBody>
-                  <a:tcPr marL="6761" marR="6761" marT="6761" marB="0" anchor="b"/>
-                </a:tc>
-                <a:tc>
-                  <a:txBody>
-                    <a:bodyPr/>
-                    <a:lstStyle/>
-                    <a:p>
-                      <a:pPr algn="r" fontAlgn="b"/>
-                      <a:r>
-                        <a:rPr lang="fr-BE" sz="1600" u="none" strike="noStrike">
+                    </a:p>
+                  </a:txBody>
+                  <a:tcPr marL="9525" marR="9525" marT="9525" marB="0" anchor="b"/>
+                </a:tc>
+                <a:tc>
+                  <a:txBody>
+                    <a:bodyPr/>
+                    <a:lstStyle/>
+                    <a:p>
+                      <a:pPr algn="r" fontAlgn="b"/>
+                      <a:r>
+                        <a:rPr lang="fr-BE" sz="1600" b="0" i="0" u="none" strike="noStrike">
+                          <a:solidFill>
+                            <a:srgbClr val="000000"/>
+                          </a:solidFill>
                           <a:effectLst/>
                           <a:latin typeface="Aptos" panose="020B0004020202020204" pitchFamily="34" charset="0"/>
                         </a:rPr>
-                        <a:t>44,4444444</a:t>
-                      </a:r>
-                      <a:endParaRPr lang="fr-BE" sz="1600" b="0" i="0" u="none" strike="noStrike">
-                        <a:solidFill>
-                          <a:srgbClr val="000000"/>
-                        </a:solidFill>
-                        <a:effectLst/>
-                        <a:latin typeface="Aptos" panose="020B0004020202020204" pitchFamily="34" charset="0"/>
-                      </a:endParaRPr>
-                    </a:p>
-                  </a:txBody>
-                  <a:tcPr marL="6761" marR="6761" marT="6761" marB="0" anchor="b"/>
-                </a:tc>
-                <a:tc>
-                  <a:txBody>
-                    <a:bodyPr/>
-                    <a:lstStyle/>
-                    <a:p>
-                      <a:pPr algn="r" fontAlgn="b"/>
-                      <a:r>
-                        <a:rPr lang="fr-BE" sz="1600" u="none" strike="noStrike" dirty="0">
+                        <a:t>44,44444444</a:t>
+                      </a:r>
+                    </a:p>
+                  </a:txBody>
+                  <a:tcPr marL="9525" marR="9525" marT="9525" marB="0" anchor="b"/>
+                </a:tc>
+                <a:tc>
+                  <a:txBody>
+                    <a:bodyPr/>
+                    <a:lstStyle/>
+                    <a:p>
+                      <a:pPr algn="r" fontAlgn="b"/>
+                      <a:r>
+                        <a:rPr lang="fr-BE" sz="1600" b="0" i="0" u="none" strike="noStrike">
+                          <a:solidFill>
+                            <a:srgbClr val="000000"/>
+                          </a:solidFill>
                           <a:effectLst/>
                           <a:latin typeface="Aptos" panose="020B0004020202020204" pitchFamily="34" charset="0"/>
                         </a:rPr>
                         <a:t>77,5739042</a:t>
                       </a:r>
-                      <a:endParaRPr lang="fr-BE" sz="1600" b="0" i="0" u="none" strike="noStrike" dirty="0">
-                        <a:solidFill>
-                          <a:srgbClr val="000000"/>
-                        </a:solidFill>
-                        <a:effectLst/>
-                        <a:latin typeface="Aptos" panose="020B0004020202020204" pitchFamily="34" charset="0"/>
-                      </a:endParaRPr>
-                    </a:p>
-                  </a:txBody>
-                  <a:tcPr marL="6761" marR="6761" marT="6761" marB="0" anchor="b"/>
+                    </a:p>
+                  </a:txBody>
+                  <a:tcPr marL="9525" marR="9525" marT="9525" marB="0" anchor="b"/>
                 </a:tc>
                 <a:tc>
                   <a:txBody>
@@ -19064,33 +19002,33 @@
                             <a:srgbClr val="000000"/>
                           </a:solidFill>
                           <a:effectLst/>
-                          <a:latin typeface="Aptos Narrow" panose="020B0004020202020204" pitchFamily="34" charset="0"/>
-                        </a:rPr>
-                        <a:t>42,3656349</a:t>
-                      </a:r>
-                    </a:p>
-                  </a:txBody>
-                  <a:tcPr marL="7620" marR="7620" marT="7620" marB="0" anchor="b"/>
-                </a:tc>
-                <a:tc>
-                  <a:txBody>
-                    <a:bodyPr/>
-                    <a:lstStyle/>
-                    <a:p>
-                      <a:pPr algn="r" fontAlgn="b"/>
-                      <a:r>
-                        <a:rPr lang="fr-BE" sz="1600" b="0" i="0" u="none" strike="noStrike">
-                          <a:solidFill>
-                            <a:srgbClr val="000000"/>
-                          </a:solidFill>
-                          <a:effectLst/>
-                          <a:latin typeface="Aptos Narrow" panose="020B0004020202020204" pitchFamily="34" charset="0"/>
-                        </a:rPr>
-                        <a:t>6</a:t>
-                      </a:r>
-                    </a:p>
-                  </a:txBody>
-                  <a:tcPr marL="7620" marR="7620" marT="7620" marB="0" anchor="b"/>
+                          <a:latin typeface="Aptos" panose="020B0004020202020204" pitchFamily="34" charset="0"/>
+                        </a:rPr>
+                        <a:t>54,5172033</a:t>
+                      </a:r>
+                    </a:p>
+                  </a:txBody>
+                  <a:tcPr marL="9525" marR="9525" marT="9525" marB="0" anchor="b"/>
+                </a:tc>
+                <a:tc>
+                  <a:txBody>
+                    <a:bodyPr/>
+                    <a:lstStyle/>
+                    <a:p>
+                      <a:pPr algn="r" fontAlgn="b"/>
+                      <a:r>
+                        <a:rPr lang="fr-BE" sz="1600" b="0" i="0" u="none" strike="noStrike" dirty="0">
+                          <a:solidFill>
+                            <a:srgbClr val="000000"/>
+                          </a:solidFill>
+                          <a:effectLst/>
+                          <a:latin typeface="Aptos" panose="020B0004020202020204" pitchFamily="34" charset="0"/>
+                        </a:rPr>
+                        <a:t>7</a:t>
+                      </a:r>
+                    </a:p>
+                  </a:txBody>
+                  <a:tcPr marL="9525" marR="9525" marT="9525" marB="0" anchor="b"/>
                 </a:tc>
                 <a:extLst>
                   <a:ext uri="{0D108BD9-81ED-4DB2-BD59-A6C34878D82A}">
@@ -19130,118 +19068,98 @@
                     <a:p>
                       <a:pPr algn="r" fontAlgn="b"/>
                       <a:r>
-                        <a:rPr lang="fr-BE" sz="1600" u="none" strike="noStrike">
+                        <a:rPr lang="fr-BE" sz="1600" b="0" i="0" u="none" strike="noStrike">
+                          <a:solidFill>
+                            <a:srgbClr val="000000"/>
+                          </a:solidFill>
                           <a:effectLst/>
                           <a:latin typeface="Aptos" panose="020B0004020202020204" pitchFamily="34" charset="0"/>
                         </a:rPr>
                         <a:t>100</a:t>
                       </a:r>
-                      <a:endParaRPr lang="fr-BE" sz="1600" b="0" i="0" u="none" strike="noStrike">
-                        <a:solidFill>
-                          <a:srgbClr val="000000"/>
-                        </a:solidFill>
-                        <a:effectLst/>
-                        <a:latin typeface="Aptos" panose="020B0004020202020204" pitchFamily="34" charset="0"/>
-                      </a:endParaRPr>
-                    </a:p>
-                  </a:txBody>
-                  <a:tcPr marL="6761" marR="6761" marT="6761" marB="0" anchor="b"/>
-                </a:tc>
-                <a:tc>
-                  <a:txBody>
-                    <a:bodyPr/>
-                    <a:lstStyle/>
-                    <a:p>
-                      <a:pPr algn="r" fontAlgn="b"/>
-                      <a:r>
-                        <a:rPr lang="fr-BE" sz="1600" u="none" strike="noStrike">
+                    </a:p>
+                  </a:txBody>
+                  <a:tcPr marL="9525" marR="9525" marT="9525" marB="0" anchor="b"/>
+                </a:tc>
+                <a:tc>
+                  <a:txBody>
+                    <a:bodyPr/>
+                    <a:lstStyle/>
+                    <a:p>
+                      <a:pPr algn="r" fontAlgn="b"/>
+                      <a:r>
+                        <a:rPr lang="fr-BE" sz="1600" b="0" i="0" u="none" strike="noStrike">
+                          <a:solidFill>
+                            <a:srgbClr val="000000"/>
+                          </a:solidFill>
                           <a:effectLst/>
                           <a:latin typeface="Aptos" panose="020B0004020202020204" pitchFamily="34" charset="0"/>
                         </a:rPr>
                         <a:t>100</a:t>
                       </a:r>
-                      <a:endParaRPr lang="fr-BE" sz="1600" b="0" i="0" u="none" strike="noStrike">
-                        <a:solidFill>
-                          <a:srgbClr val="000000"/>
-                        </a:solidFill>
-                        <a:effectLst/>
-                        <a:latin typeface="Aptos" panose="020B0004020202020204" pitchFamily="34" charset="0"/>
-                      </a:endParaRPr>
-                    </a:p>
-                  </a:txBody>
-                  <a:tcPr marL="6761" marR="6761" marT="6761" marB="0" anchor="b"/>
-                </a:tc>
-                <a:tc>
-                  <a:txBody>
-                    <a:bodyPr/>
-                    <a:lstStyle/>
-                    <a:p>
-                      <a:pPr algn="r" fontAlgn="b"/>
-                      <a:r>
-                        <a:rPr lang="fr-BE" sz="1600" u="none" strike="noStrike" dirty="0">
+                    </a:p>
+                  </a:txBody>
+                  <a:tcPr marL="9525" marR="9525" marT="9525" marB="0" anchor="b"/>
+                </a:tc>
+                <a:tc>
+                  <a:txBody>
+                    <a:bodyPr/>
+                    <a:lstStyle/>
+                    <a:p>
+                      <a:pPr algn="r" fontAlgn="b"/>
+                      <a:r>
+                        <a:rPr lang="fr-BE" sz="1600" b="0" i="0" u="none" strike="noStrike" dirty="0">
+                          <a:solidFill>
+                            <a:srgbClr val="000000"/>
+                          </a:solidFill>
                           <a:effectLst/>
                           <a:latin typeface="Aptos" panose="020B0004020202020204" pitchFamily="34" charset="0"/>
                         </a:rPr>
                         <a:t>40</a:t>
                       </a:r>
-                      <a:endParaRPr lang="fr-BE" sz="1600" b="0" i="0" u="none" strike="noStrike" dirty="0">
-                        <a:solidFill>
-                          <a:srgbClr val="000000"/>
-                        </a:solidFill>
-                        <a:effectLst/>
-                        <a:latin typeface="Aptos" panose="020B0004020202020204" pitchFamily="34" charset="0"/>
-                      </a:endParaRPr>
-                    </a:p>
-                  </a:txBody>
-                  <a:tcPr marL="6761" marR="6761" marT="6761" marB="0" anchor="b"/>
-                </a:tc>
-                <a:tc>
-                  <a:txBody>
-                    <a:bodyPr/>
-                    <a:lstStyle/>
-                    <a:p>
-                      <a:pPr algn="r" fontAlgn="b"/>
-                      <a:r>
-                        <a:rPr lang="fr-BE" sz="1600" u="none" strike="noStrike">
+                    </a:p>
+                  </a:txBody>
+                  <a:tcPr marL="9525" marR="9525" marT="9525" marB="0" anchor="b"/>
+                </a:tc>
+                <a:tc>
+                  <a:txBody>
+                    <a:bodyPr/>
+                    <a:lstStyle/>
+                    <a:p>
+                      <a:pPr algn="r" fontAlgn="b"/>
+                      <a:r>
+                        <a:rPr lang="fr-BE" sz="1600" b="0" i="0" u="none" strike="noStrike" dirty="0">
+                          <a:solidFill>
+                            <a:srgbClr val="000000"/>
+                          </a:solidFill>
                           <a:effectLst/>
                           <a:latin typeface="Aptos" panose="020B0004020202020204" pitchFamily="34" charset="0"/>
                         </a:rPr>
-                        <a:t>44,4444444</a:t>
-                      </a:r>
-                      <a:endParaRPr lang="fr-BE" sz="1600" b="0" i="0" u="none" strike="noStrike">
-                        <a:solidFill>
-                          <a:srgbClr val="000000"/>
-                        </a:solidFill>
-                        <a:effectLst/>
-                        <a:latin typeface="Aptos" panose="020B0004020202020204" pitchFamily="34" charset="0"/>
-                      </a:endParaRPr>
-                    </a:p>
-                  </a:txBody>
-                  <a:tcPr marL="6761" marR="6761" marT="6761" marB="0" anchor="b"/>
-                </a:tc>
-                <a:tc>
-                  <a:txBody>
-                    <a:bodyPr/>
-                    <a:lstStyle/>
-                    <a:p>
-                      <a:pPr algn="r" fontAlgn="b"/>
-                      <a:r>
-                        <a:rPr lang="fr-BE" sz="1600" u="none" strike="noStrike">
+                        <a:t>44,44444444</a:t>
+                      </a:r>
+                    </a:p>
+                  </a:txBody>
+                  <a:tcPr marL="9525" marR="9525" marT="9525" marB="0" anchor="b"/>
+                </a:tc>
+                <a:tc>
+                  <a:txBody>
+                    <a:bodyPr/>
+                    <a:lstStyle/>
+                    <a:p>
+                      <a:pPr algn="r" fontAlgn="b"/>
+                      <a:r>
+                        <a:rPr lang="fr-BE" sz="1600" b="0" i="0" u="none" strike="noStrike">
+                          <a:solidFill>
+                            <a:srgbClr val="000000"/>
+                          </a:solidFill>
                           <a:effectLst/>
                           <a:latin typeface="Aptos" panose="020B0004020202020204" pitchFamily="34" charset="0"/>
                         </a:rPr>
                         <a:t>95,412844</a:t>
                       </a:r>
-                      <a:endParaRPr lang="fr-BE" sz="1600" b="0" i="0" u="none" strike="noStrike">
-                        <a:solidFill>
-                          <a:srgbClr val="000000"/>
-                        </a:solidFill>
-                        <a:effectLst/>
-                        <a:latin typeface="Aptos" panose="020B0004020202020204" pitchFamily="34" charset="0"/>
-                      </a:endParaRPr>
-                    </a:p>
-                  </a:txBody>
-                  <a:tcPr marL="6761" marR="6761" marT="6761" marB="0" anchor="b"/>
+                    </a:p>
+                  </a:txBody>
+                  <a:tcPr marL="9525" marR="9525" marT="9525" marB="0" anchor="b"/>
                 </a:tc>
                 <a:tc>
                   <a:txBody>
@@ -19255,33 +19173,33 @@
                             <a:srgbClr val="000000"/>
                           </a:solidFill>
                           <a:effectLst/>
-                          <a:latin typeface="Aptos Narrow" panose="020B0004020202020204" pitchFamily="34" charset="0"/>
-                        </a:rPr>
-                        <a:t>41,2463905</a:t>
-                      </a:r>
-                    </a:p>
-                  </a:txBody>
-                  <a:tcPr marL="7620" marR="7620" marT="7620" marB="0" anchor="b"/>
-                </a:tc>
-                <a:tc>
-                  <a:txBody>
-                    <a:bodyPr/>
-                    <a:lstStyle/>
-                    <a:p>
-                      <a:pPr algn="r" fontAlgn="b"/>
-                      <a:r>
-                        <a:rPr lang="fr-BE" sz="1600" b="0" i="0" u="none" strike="noStrike">
-                          <a:solidFill>
-                            <a:srgbClr val="000000"/>
-                          </a:solidFill>
-                          <a:effectLst/>
-                          <a:latin typeface="Aptos Narrow" panose="020B0004020202020204" pitchFamily="34" charset="0"/>
-                        </a:rPr>
-                        <a:t>7</a:t>
-                      </a:r>
-                    </a:p>
-                  </a:txBody>
-                  <a:tcPr marL="7620" marR="7620" marT="7620" marB="0" anchor="b"/>
+                          <a:latin typeface="Aptos" panose="020B0004020202020204" pitchFamily="34" charset="0"/>
+                        </a:rPr>
+                        <a:t>59,9410716</a:t>
+                      </a:r>
+                    </a:p>
+                  </a:txBody>
+                  <a:tcPr marL="9525" marR="9525" marT="9525" marB="0" anchor="b"/>
+                </a:tc>
+                <a:tc>
+                  <a:txBody>
+                    <a:bodyPr/>
+                    <a:lstStyle/>
+                    <a:p>
+                      <a:pPr algn="r" fontAlgn="b"/>
+                      <a:r>
+                        <a:rPr lang="fr-BE" sz="1600" b="0" i="0" u="none" strike="noStrike" dirty="0">
+                          <a:solidFill>
+                            <a:srgbClr val="000000"/>
+                          </a:solidFill>
+                          <a:effectLst/>
+                          <a:latin typeface="Aptos" panose="020B0004020202020204" pitchFamily="34" charset="0"/>
+                        </a:rPr>
+                        <a:t>4</a:t>
+                      </a:r>
+                    </a:p>
+                  </a:txBody>
+                  <a:tcPr marL="9525" marR="9525" marT="9525" marB="0" anchor="b"/>
                 </a:tc>
                 <a:extLst>
                   <a:ext uri="{0D108BD9-81ED-4DB2-BD59-A6C34878D82A}">
@@ -19321,118 +19239,98 @@
                     <a:p>
                       <a:pPr algn="r" fontAlgn="b"/>
                       <a:r>
-                        <a:rPr lang="fr-BE" sz="1600" u="none" strike="noStrike">
+                        <a:rPr lang="fr-BE" sz="1600" b="0" i="0" u="none" strike="noStrike">
+                          <a:solidFill>
+                            <a:srgbClr val="000000"/>
+                          </a:solidFill>
                           <a:effectLst/>
                           <a:latin typeface="Aptos" panose="020B0004020202020204" pitchFamily="34" charset="0"/>
                         </a:rPr>
                         <a:t>100</a:t>
                       </a:r>
-                      <a:endParaRPr lang="fr-BE" sz="1600" b="0" i="0" u="none" strike="noStrike">
-                        <a:solidFill>
-                          <a:srgbClr val="000000"/>
-                        </a:solidFill>
-                        <a:effectLst/>
-                        <a:latin typeface="Aptos" panose="020B0004020202020204" pitchFamily="34" charset="0"/>
-                      </a:endParaRPr>
-                    </a:p>
-                  </a:txBody>
-                  <a:tcPr marL="6761" marR="6761" marT="6761" marB="0" anchor="b"/>
-                </a:tc>
-                <a:tc>
-                  <a:txBody>
-                    <a:bodyPr/>
-                    <a:lstStyle/>
-                    <a:p>
-                      <a:pPr algn="r" fontAlgn="b"/>
-                      <a:r>
-                        <a:rPr lang="fr-BE" sz="1600" u="none" strike="noStrike">
+                    </a:p>
+                  </a:txBody>
+                  <a:tcPr marL="9525" marR="9525" marT="9525" marB="0" anchor="b"/>
+                </a:tc>
+                <a:tc>
+                  <a:txBody>
+                    <a:bodyPr/>
+                    <a:lstStyle/>
+                    <a:p>
+                      <a:pPr algn="r" fontAlgn="b"/>
+                      <a:r>
+                        <a:rPr lang="fr-BE" sz="1600" b="0" i="0" u="none" strike="noStrike">
+                          <a:solidFill>
+                            <a:srgbClr val="000000"/>
+                          </a:solidFill>
                           <a:effectLst/>
                           <a:latin typeface="Aptos" panose="020B0004020202020204" pitchFamily="34" charset="0"/>
                         </a:rPr>
                         <a:t>100</a:t>
                       </a:r>
-                      <a:endParaRPr lang="fr-BE" sz="1600" b="0" i="0" u="none" strike="noStrike">
-                        <a:solidFill>
-                          <a:srgbClr val="000000"/>
-                        </a:solidFill>
-                        <a:effectLst/>
-                        <a:latin typeface="Aptos" panose="020B0004020202020204" pitchFamily="34" charset="0"/>
-                      </a:endParaRPr>
-                    </a:p>
-                  </a:txBody>
-                  <a:tcPr marL="6761" marR="6761" marT="6761" marB="0" anchor="b"/>
-                </a:tc>
-                <a:tc>
-                  <a:txBody>
-                    <a:bodyPr/>
-                    <a:lstStyle/>
-                    <a:p>
-                      <a:pPr algn="r" fontAlgn="b"/>
-                      <a:r>
-                        <a:rPr lang="fr-BE" sz="1600" u="none" strike="noStrike" dirty="0">
+                    </a:p>
+                  </a:txBody>
+                  <a:tcPr marL="9525" marR="9525" marT="9525" marB="0" anchor="b"/>
+                </a:tc>
+                <a:tc>
+                  <a:txBody>
+                    <a:bodyPr/>
+                    <a:lstStyle/>
+                    <a:p>
+                      <a:pPr algn="r" fontAlgn="b"/>
+                      <a:r>
+                        <a:rPr lang="fr-BE" sz="1600" b="0" i="0" u="none" strike="noStrike">
+                          <a:solidFill>
+                            <a:srgbClr val="000000"/>
+                          </a:solidFill>
                           <a:effectLst/>
                           <a:latin typeface="Aptos" panose="020B0004020202020204" pitchFamily="34" charset="0"/>
                         </a:rPr>
                         <a:t>40</a:t>
                       </a:r>
-                      <a:endParaRPr lang="fr-BE" sz="1600" b="0" i="0" u="none" strike="noStrike" dirty="0">
-                        <a:solidFill>
-                          <a:srgbClr val="000000"/>
-                        </a:solidFill>
-                        <a:effectLst/>
-                        <a:latin typeface="Aptos" panose="020B0004020202020204" pitchFamily="34" charset="0"/>
-                      </a:endParaRPr>
-                    </a:p>
-                  </a:txBody>
-                  <a:tcPr marL="6761" marR="6761" marT="6761" marB="0" anchor="b"/>
-                </a:tc>
-                <a:tc>
-                  <a:txBody>
-                    <a:bodyPr/>
-                    <a:lstStyle/>
-                    <a:p>
-                      <a:pPr algn="r" fontAlgn="b"/>
-                      <a:r>
-                        <a:rPr lang="fr-BE" sz="1600" u="none" strike="noStrike">
+                    </a:p>
+                  </a:txBody>
+                  <a:tcPr marL="9525" marR="9525" marT="9525" marB="0" anchor="b"/>
+                </a:tc>
+                <a:tc>
+                  <a:txBody>
+                    <a:bodyPr/>
+                    <a:lstStyle/>
+                    <a:p>
+                      <a:pPr algn="r" fontAlgn="b"/>
+                      <a:r>
+                        <a:rPr lang="fr-BE" sz="1600" b="0" i="0" u="none" strike="noStrike" dirty="0">
+                          <a:solidFill>
+                            <a:srgbClr val="000000"/>
+                          </a:solidFill>
                           <a:effectLst/>
                           <a:latin typeface="Aptos" panose="020B0004020202020204" pitchFamily="34" charset="0"/>
                         </a:rPr>
-                        <a:t>33,3333333</a:t>
-                      </a:r>
-                      <a:endParaRPr lang="fr-BE" sz="1600" b="0" i="0" u="none" strike="noStrike">
-                        <a:solidFill>
-                          <a:srgbClr val="000000"/>
-                        </a:solidFill>
-                        <a:effectLst/>
-                        <a:latin typeface="Aptos" panose="020B0004020202020204" pitchFamily="34" charset="0"/>
-                      </a:endParaRPr>
-                    </a:p>
-                  </a:txBody>
-                  <a:tcPr marL="6761" marR="6761" marT="6761" marB="0" anchor="b"/>
-                </a:tc>
-                <a:tc>
-                  <a:txBody>
-                    <a:bodyPr/>
-                    <a:lstStyle/>
-                    <a:p>
-                      <a:pPr algn="r" fontAlgn="b"/>
-                      <a:r>
-                        <a:rPr lang="fr-BE" sz="1600" u="none" strike="noStrike">
+                        <a:t>33,33333333</a:t>
+                      </a:r>
+                    </a:p>
+                  </a:txBody>
+                  <a:tcPr marL="9525" marR="9525" marT="9525" marB="0" anchor="b"/>
+                </a:tc>
+                <a:tc>
+                  <a:txBody>
+                    <a:bodyPr/>
+                    <a:lstStyle/>
+                    <a:p>
+                      <a:pPr algn="r" fontAlgn="b"/>
+                      <a:r>
+                        <a:rPr lang="fr-BE" sz="1600" b="0" i="0" u="none" strike="noStrike" dirty="0">
+                          <a:solidFill>
+                            <a:srgbClr val="000000"/>
+                          </a:solidFill>
                           <a:effectLst/>
                           <a:latin typeface="Aptos" panose="020B0004020202020204" pitchFamily="34" charset="0"/>
                         </a:rPr>
                         <a:t>0</a:t>
                       </a:r>
-                      <a:endParaRPr lang="fr-BE" sz="1600" b="0" i="0" u="none" strike="noStrike">
-                        <a:solidFill>
-                          <a:srgbClr val="000000"/>
-                        </a:solidFill>
-                        <a:effectLst/>
-                        <a:latin typeface="Aptos" panose="020B0004020202020204" pitchFamily="34" charset="0"/>
-                      </a:endParaRPr>
-                    </a:p>
-                  </a:txBody>
-                  <a:tcPr marL="6761" marR="6761" marT="6761" marB="0" anchor="b"/>
+                    </a:p>
+                  </a:txBody>
+                  <a:tcPr marL="9525" marR="9525" marT="9525" marB="0" anchor="b"/>
                 </a:tc>
                 <a:tc>
                   <a:txBody>
@@ -19446,33 +19344,33 @@
                             <a:srgbClr val="000000"/>
                           </a:solidFill>
                           <a:effectLst/>
-                          <a:latin typeface="Aptos Narrow" panose="020B0004020202020204" pitchFamily="34" charset="0"/>
-                        </a:rPr>
-                        <a:t>63,7029099</a:t>
-                      </a:r>
-                    </a:p>
-                  </a:txBody>
-                  <a:tcPr marL="7620" marR="7620" marT="7620" marB="0" anchor="b"/>
-                </a:tc>
-                <a:tc>
-                  <a:txBody>
-                    <a:bodyPr/>
-                    <a:lstStyle/>
-                    <a:p>
-                      <a:pPr algn="r" fontAlgn="b"/>
-                      <a:r>
-                        <a:rPr lang="fr-BE" sz="1600" b="0" i="0" u="none" strike="noStrike">
-                          <a:solidFill>
-                            <a:srgbClr val="000000"/>
-                          </a:solidFill>
-                          <a:effectLst/>
-                          <a:latin typeface="Aptos Narrow" panose="020B0004020202020204" pitchFamily="34" charset="0"/>
-                        </a:rPr>
-                        <a:t>2</a:t>
-                      </a:r>
-                    </a:p>
-                  </a:txBody>
-                  <a:tcPr marL="7620" marR="7620" marT="7620" marB="0" anchor="b"/>
+                          <a:latin typeface="Aptos" panose="020B0004020202020204" pitchFamily="34" charset="0"/>
+                        </a:rPr>
+                        <a:t>41,7168742</a:t>
+                      </a:r>
+                    </a:p>
+                  </a:txBody>
+                  <a:tcPr marL="9525" marR="9525" marT="9525" marB="0" anchor="b"/>
+                </a:tc>
+                <a:tc>
+                  <a:txBody>
+                    <a:bodyPr/>
+                    <a:lstStyle/>
+                    <a:p>
+                      <a:pPr algn="r" fontAlgn="b"/>
+                      <a:r>
+                        <a:rPr lang="fr-BE" sz="1600" b="0" i="0" u="none" strike="noStrike" dirty="0">
+                          <a:solidFill>
+                            <a:srgbClr val="000000"/>
+                          </a:solidFill>
+                          <a:effectLst/>
+                          <a:latin typeface="Aptos" panose="020B0004020202020204" pitchFamily="34" charset="0"/>
+                        </a:rPr>
+                        <a:t>8</a:t>
+                      </a:r>
+                    </a:p>
+                  </a:txBody>
+                  <a:tcPr marL="9525" marR="9525" marT="9525" marB="0" anchor="b"/>
                 </a:tc>
                 <a:extLst>
                   <a:ext uri="{0D108BD9-81ED-4DB2-BD59-A6C34878D82A}">
@@ -19512,118 +19410,98 @@
                     <a:p>
                       <a:pPr algn="r" fontAlgn="b"/>
                       <a:r>
-                        <a:rPr lang="fr-BE" sz="1600" u="none" strike="noStrike">
+                        <a:rPr lang="fr-BE" sz="1600" b="0" i="0" u="none" strike="noStrike">
+                          <a:solidFill>
+                            <a:srgbClr val="000000"/>
+                          </a:solidFill>
                           <a:effectLst/>
                           <a:latin typeface="Aptos" panose="020B0004020202020204" pitchFamily="34" charset="0"/>
                         </a:rPr>
                         <a:t>100</a:t>
                       </a:r>
-                      <a:endParaRPr lang="fr-BE" sz="1600" b="0" i="0" u="none" strike="noStrike">
-                        <a:solidFill>
-                          <a:srgbClr val="000000"/>
-                        </a:solidFill>
-                        <a:effectLst/>
-                        <a:latin typeface="Aptos" panose="020B0004020202020204" pitchFamily="34" charset="0"/>
-                      </a:endParaRPr>
-                    </a:p>
-                  </a:txBody>
-                  <a:tcPr marL="6761" marR="6761" marT="6761" marB="0" anchor="b"/>
-                </a:tc>
-                <a:tc>
-                  <a:txBody>
-                    <a:bodyPr/>
-                    <a:lstStyle/>
-                    <a:p>
-                      <a:pPr algn="r" fontAlgn="b"/>
-                      <a:r>
-                        <a:rPr lang="fr-BE" sz="1600" u="none" strike="noStrike">
+                    </a:p>
+                  </a:txBody>
+                  <a:tcPr marL="9525" marR="9525" marT="9525" marB="0" anchor="b"/>
+                </a:tc>
+                <a:tc>
+                  <a:txBody>
+                    <a:bodyPr/>
+                    <a:lstStyle/>
+                    <a:p>
+                      <a:pPr algn="r" fontAlgn="b"/>
+                      <a:r>
+                        <a:rPr lang="fr-BE" sz="1600" b="0" i="0" u="none" strike="noStrike">
+                          <a:solidFill>
+                            <a:srgbClr val="000000"/>
+                          </a:solidFill>
                           <a:effectLst/>
                           <a:latin typeface="Aptos" panose="020B0004020202020204" pitchFamily="34" charset="0"/>
                         </a:rPr>
                         <a:t>90</a:t>
                       </a:r>
-                      <a:endParaRPr lang="fr-BE" sz="1600" b="0" i="0" u="none" strike="noStrike">
-                        <a:solidFill>
-                          <a:srgbClr val="000000"/>
-                        </a:solidFill>
-                        <a:effectLst/>
-                        <a:latin typeface="Aptos" panose="020B0004020202020204" pitchFamily="34" charset="0"/>
-                      </a:endParaRPr>
-                    </a:p>
-                  </a:txBody>
-                  <a:tcPr marL="6761" marR="6761" marT="6761" marB="0" anchor="b"/>
-                </a:tc>
-                <a:tc>
-                  <a:txBody>
-                    <a:bodyPr/>
-                    <a:lstStyle/>
-                    <a:p>
-                      <a:pPr algn="r" fontAlgn="b"/>
-                      <a:r>
-                        <a:rPr lang="fr-BE" sz="1600" u="none" strike="noStrike" dirty="0">
+                    </a:p>
+                  </a:txBody>
+                  <a:tcPr marL="9525" marR="9525" marT="9525" marB="0" anchor="b"/>
+                </a:tc>
+                <a:tc>
+                  <a:txBody>
+                    <a:bodyPr/>
+                    <a:lstStyle/>
+                    <a:p>
+                      <a:pPr algn="r" fontAlgn="b"/>
+                      <a:r>
+                        <a:rPr lang="fr-BE" sz="1600" b="0" i="0" u="none" strike="noStrike">
+                          <a:solidFill>
+                            <a:srgbClr val="000000"/>
+                          </a:solidFill>
                           <a:effectLst/>
                           <a:latin typeface="Aptos" panose="020B0004020202020204" pitchFamily="34" charset="0"/>
                         </a:rPr>
                         <a:t>40</a:t>
                       </a:r>
-                      <a:endParaRPr lang="fr-BE" sz="1600" b="0" i="0" u="none" strike="noStrike" dirty="0">
-                        <a:solidFill>
-                          <a:srgbClr val="000000"/>
-                        </a:solidFill>
-                        <a:effectLst/>
-                        <a:latin typeface="Aptos" panose="020B0004020202020204" pitchFamily="34" charset="0"/>
-                      </a:endParaRPr>
-                    </a:p>
-                  </a:txBody>
-                  <a:tcPr marL="6761" marR="6761" marT="6761" marB="0" anchor="b"/>
-                </a:tc>
-                <a:tc>
-                  <a:txBody>
-                    <a:bodyPr/>
-                    <a:lstStyle/>
-                    <a:p>
-                      <a:pPr algn="r" fontAlgn="b"/>
-                      <a:r>
-                        <a:rPr lang="fr-BE" sz="1600" u="none" strike="noStrike">
+                    </a:p>
+                  </a:txBody>
+                  <a:tcPr marL="9525" marR="9525" marT="9525" marB="0" anchor="b"/>
+                </a:tc>
+                <a:tc>
+                  <a:txBody>
+                    <a:bodyPr/>
+                    <a:lstStyle/>
+                    <a:p>
+                      <a:pPr algn="r" fontAlgn="b"/>
+                      <a:r>
+                        <a:rPr lang="fr-BE" sz="1600" b="0" i="0" u="none" strike="noStrike" dirty="0">
+                          <a:solidFill>
+                            <a:srgbClr val="000000"/>
+                          </a:solidFill>
                           <a:effectLst/>
                           <a:latin typeface="Aptos" panose="020B0004020202020204" pitchFamily="34" charset="0"/>
                         </a:rPr>
-                        <a:t>44,4444444</a:t>
-                      </a:r>
-                      <a:endParaRPr lang="fr-BE" sz="1600" b="0" i="0" u="none" strike="noStrike">
-                        <a:solidFill>
-                          <a:srgbClr val="000000"/>
-                        </a:solidFill>
-                        <a:effectLst/>
-                        <a:latin typeface="Aptos" panose="020B0004020202020204" pitchFamily="34" charset="0"/>
-                      </a:endParaRPr>
-                    </a:p>
-                  </a:txBody>
-                  <a:tcPr marL="6761" marR="6761" marT="6761" marB="0" anchor="b"/>
-                </a:tc>
-                <a:tc>
-                  <a:txBody>
-                    <a:bodyPr/>
-                    <a:lstStyle/>
-                    <a:p>
-                      <a:pPr algn="r" fontAlgn="b"/>
-                      <a:r>
-                        <a:rPr lang="fr-BE" sz="1600" u="none" strike="noStrike">
+                        <a:t>44,44444444</a:t>
+                      </a:r>
+                    </a:p>
+                  </a:txBody>
+                  <a:tcPr marL="9525" marR="9525" marT="9525" marB="0" anchor="b"/>
+                </a:tc>
+                <a:tc>
+                  <a:txBody>
+                    <a:bodyPr/>
+                    <a:lstStyle/>
+                    <a:p>
+                      <a:pPr algn="r" fontAlgn="b"/>
+                      <a:r>
+                        <a:rPr lang="fr-BE" sz="1600" b="0" i="0" u="none" strike="noStrike" dirty="0">
+                          <a:solidFill>
+                            <a:srgbClr val="000000"/>
+                          </a:solidFill>
                           <a:effectLst/>
                           <a:latin typeface="Aptos" panose="020B0004020202020204" pitchFamily="34" charset="0"/>
                         </a:rPr>
                         <a:t>92,8644241</a:t>
                       </a:r>
-                      <a:endParaRPr lang="fr-BE" sz="1600" b="0" i="0" u="none" strike="noStrike">
-                        <a:solidFill>
-                          <a:srgbClr val="000000"/>
-                        </a:solidFill>
-                        <a:effectLst/>
-                        <a:latin typeface="Aptos" panose="020B0004020202020204" pitchFamily="34" charset="0"/>
-                      </a:endParaRPr>
-                    </a:p>
-                  </a:txBody>
-                  <a:tcPr marL="6761" marR="6761" marT="6761" marB="0" anchor="b"/>
+                    </a:p>
+                  </a:txBody>
+                  <a:tcPr marL="9525" marR="9525" marT="9525" marB="0" anchor="b"/>
                 </a:tc>
                 <a:tc>
                   <a:txBody>
@@ -19637,33 +19515,33 @@
                             <a:srgbClr val="000000"/>
                           </a:solidFill>
                           <a:effectLst/>
-                          <a:latin typeface="Aptos Narrow" panose="020B0004020202020204" pitchFamily="34" charset="0"/>
-                        </a:rPr>
-                        <a:t>41,2463905</a:t>
-                      </a:r>
-                    </a:p>
-                  </a:txBody>
-                  <a:tcPr marL="7620" marR="7620" marT="7620" marB="0" anchor="b"/>
-                </a:tc>
-                <a:tc>
-                  <a:txBody>
-                    <a:bodyPr/>
-                    <a:lstStyle/>
-                    <a:p>
-                      <a:pPr algn="r" fontAlgn="b"/>
-                      <a:r>
-                        <a:rPr lang="fr-BE" sz="1600" b="0" i="0" u="none" strike="noStrike">
-                          <a:solidFill>
-                            <a:srgbClr val="000000"/>
-                          </a:solidFill>
-                          <a:effectLst/>
-                          <a:latin typeface="Aptos Narrow" panose="020B0004020202020204" pitchFamily="34" charset="0"/>
-                        </a:rPr>
-                        <a:t>7</a:t>
-                      </a:r>
-                    </a:p>
-                  </a:txBody>
-                  <a:tcPr marL="7620" marR="7620" marT="7620" marB="0" anchor="b"/>
+                          <a:latin typeface="Aptos" panose="020B0004020202020204" pitchFamily="34" charset="0"/>
+                        </a:rPr>
+                        <a:t>59,0615254</a:t>
+                      </a:r>
+                    </a:p>
+                  </a:txBody>
+                  <a:tcPr marL="9525" marR="9525" marT="9525" marB="0" anchor="b"/>
+                </a:tc>
+                <a:tc>
+                  <a:txBody>
+                    <a:bodyPr/>
+                    <a:lstStyle/>
+                    <a:p>
+                      <a:pPr algn="r" fontAlgn="b"/>
+                      <a:r>
+                        <a:rPr lang="fr-BE" sz="1600" b="0" i="0" u="none" strike="noStrike" dirty="0">
+                          <a:solidFill>
+                            <a:srgbClr val="000000"/>
+                          </a:solidFill>
+                          <a:effectLst/>
+                          <a:latin typeface="Aptos" panose="020B0004020202020204" pitchFamily="34" charset="0"/>
+                        </a:rPr>
+                        <a:t>5</a:t>
+                      </a:r>
+                    </a:p>
+                  </a:txBody>
+                  <a:tcPr marL="9525" marR="9525" marT="9525" marB="0" anchor="b"/>
                 </a:tc>
                 <a:extLst>
                   <a:ext uri="{0D108BD9-81ED-4DB2-BD59-A6C34878D82A}">
@@ -19703,118 +19581,98 @@
                     <a:p>
                       <a:pPr algn="r" fontAlgn="b"/>
                       <a:r>
-                        <a:rPr lang="fr-BE" sz="1600" u="none" strike="noStrike">
+                        <a:rPr lang="fr-BE" sz="1600" b="0" i="0" u="none" strike="noStrike">
+                          <a:solidFill>
+                            <a:srgbClr val="000000"/>
+                          </a:solidFill>
                           <a:effectLst/>
                           <a:latin typeface="Aptos" panose="020B0004020202020204" pitchFamily="34" charset="0"/>
                         </a:rPr>
                         <a:t>100</a:t>
                       </a:r>
-                      <a:endParaRPr lang="fr-BE" sz="1600" b="0" i="0" u="none" strike="noStrike">
-                        <a:solidFill>
-                          <a:srgbClr val="000000"/>
-                        </a:solidFill>
-                        <a:effectLst/>
-                        <a:latin typeface="Aptos" panose="020B0004020202020204" pitchFamily="34" charset="0"/>
-                      </a:endParaRPr>
-                    </a:p>
-                  </a:txBody>
-                  <a:tcPr marL="6761" marR="6761" marT="6761" marB="0" anchor="b"/>
-                </a:tc>
-                <a:tc>
-                  <a:txBody>
-                    <a:bodyPr/>
-                    <a:lstStyle/>
-                    <a:p>
-                      <a:pPr algn="r" fontAlgn="b"/>
-                      <a:r>
-                        <a:rPr lang="fr-BE" sz="1600" u="none" strike="noStrike">
+                    </a:p>
+                  </a:txBody>
+                  <a:tcPr marL="9525" marR="9525" marT="9525" marB="0" anchor="b"/>
+                </a:tc>
+                <a:tc>
+                  <a:txBody>
+                    <a:bodyPr/>
+                    <a:lstStyle/>
+                    <a:p>
+                      <a:pPr algn="r" fontAlgn="b"/>
+                      <a:r>
+                        <a:rPr lang="fr-BE" sz="1600" b="0" i="0" u="none" strike="noStrike">
+                          <a:solidFill>
+                            <a:srgbClr val="000000"/>
+                          </a:solidFill>
                           <a:effectLst/>
                           <a:latin typeface="Aptos" panose="020B0004020202020204" pitchFamily="34" charset="0"/>
                         </a:rPr>
                         <a:t>100</a:t>
                       </a:r>
-                      <a:endParaRPr lang="fr-BE" sz="1600" b="0" i="0" u="none" strike="noStrike">
-                        <a:solidFill>
-                          <a:srgbClr val="000000"/>
-                        </a:solidFill>
-                        <a:effectLst/>
-                        <a:latin typeface="Aptos" panose="020B0004020202020204" pitchFamily="34" charset="0"/>
-                      </a:endParaRPr>
-                    </a:p>
-                  </a:txBody>
-                  <a:tcPr marL="6761" marR="6761" marT="6761" marB="0" anchor="b"/>
-                </a:tc>
-                <a:tc>
-                  <a:txBody>
-                    <a:bodyPr/>
-                    <a:lstStyle/>
-                    <a:p>
-                      <a:pPr algn="r" fontAlgn="b"/>
-                      <a:r>
-                        <a:rPr lang="fr-BE" sz="1600" u="none" strike="noStrike" dirty="0">
+                    </a:p>
+                  </a:txBody>
+                  <a:tcPr marL="9525" marR="9525" marT="9525" marB="0" anchor="b"/>
+                </a:tc>
+                <a:tc>
+                  <a:txBody>
+                    <a:bodyPr/>
+                    <a:lstStyle/>
+                    <a:p>
+                      <a:pPr algn="r" fontAlgn="b"/>
+                      <a:r>
+                        <a:rPr lang="fr-BE" sz="1600" b="0" i="0" u="none" strike="noStrike">
+                          <a:solidFill>
+                            <a:srgbClr val="000000"/>
+                          </a:solidFill>
                           <a:effectLst/>
                           <a:latin typeface="Aptos" panose="020B0004020202020204" pitchFamily="34" charset="0"/>
                         </a:rPr>
                         <a:t>60</a:t>
                       </a:r>
-                      <a:endParaRPr lang="fr-BE" sz="1600" b="0" i="0" u="none" strike="noStrike" dirty="0">
-                        <a:solidFill>
-                          <a:srgbClr val="000000"/>
-                        </a:solidFill>
-                        <a:effectLst/>
-                        <a:latin typeface="Aptos" panose="020B0004020202020204" pitchFamily="34" charset="0"/>
-                      </a:endParaRPr>
-                    </a:p>
-                  </a:txBody>
-                  <a:tcPr marL="6761" marR="6761" marT="6761" marB="0" anchor="b"/>
-                </a:tc>
-                <a:tc>
-                  <a:txBody>
-                    <a:bodyPr/>
-                    <a:lstStyle/>
-                    <a:p>
-                      <a:pPr algn="r" fontAlgn="b"/>
-                      <a:r>
-                        <a:rPr lang="fr-BE" sz="1600" u="none" strike="noStrike">
+                    </a:p>
+                  </a:txBody>
+                  <a:tcPr marL="9525" marR="9525" marT="9525" marB="0" anchor="b"/>
+                </a:tc>
+                <a:tc>
+                  <a:txBody>
+                    <a:bodyPr/>
+                    <a:lstStyle/>
+                    <a:p>
+                      <a:pPr algn="r" fontAlgn="b"/>
+                      <a:r>
+                        <a:rPr lang="fr-BE" sz="1600" b="0" i="0" u="none" strike="noStrike">
+                          <a:solidFill>
+                            <a:srgbClr val="000000"/>
+                          </a:solidFill>
                           <a:effectLst/>
                           <a:latin typeface="Aptos" panose="020B0004020202020204" pitchFamily="34" charset="0"/>
                         </a:rPr>
-                        <a:t>44,4444444</a:t>
-                      </a:r>
-                      <a:endParaRPr lang="fr-BE" sz="1600" b="0" i="0" u="none" strike="noStrike">
-                        <a:solidFill>
-                          <a:srgbClr val="000000"/>
-                        </a:solidFill>
-                        <a:effectLst/>
-                        <a:latin typeface="Aptos" panose="020B0004020202020204" pitchFamily="34" charset="0"/>
-                      </a:endParaRPr>
-                    </a:p>
-                  </a:txBody>
-                  <a:tcPr marL="6761" marR="6761" marT="6761" marB="0" anchor="b"/>
-                </a:tc>
-                <a:tc>
-                  <a:txBody>
-                    <a:bodyPr/>
-                    <a:lstStyle/>
-                    <a:p>
-                      <a:pPr algn="r" fontAlgn="b"/>
-                      <a:r>
-                        <a:rPr lang="fr-BE" sz="1600" u="none" strike="noStrike">
+                        <a:t>44,44444444</a:t>
+                      </a:r>
+                    </a:p>
+                  </a:txBody>
+                  <a:tcPr marL="9525" marR="9525" marT="9525" marB="0" anchor="b"/>
+                </a:tc>
+                <a:tc>
+                  <a:txBody>
+                    <a:bodyPr/>
+                    <a:lstStyle/>
+                    <a:p>
+                      <a:pPr algn="r" fontAlgn="b"/>
+                      <a:r>
+                        <a:rPr lang="fr-BE" sz="1600" b="0" i="0" u="none" strike="noStrike" dirty="0">
+                          <a:solidFill>
+                            <a:srgbClr val="000000"/>
+                          </a:solidFill>
                           <a:effectLst/>
                           <a:latin typeface="Aptos" panose="020B0004020202020204" pitchFamily="34" charset="0"/>
                         </a:rPr>
                         <a:t>82,6707441</a:t>
                       </a:r>
-                      <a:endParaRPr lang="fr-BE" sz="1600" b="0" i="0" u="none" strike="noStrike">
-                        <a:solidFill>
-                          <a:srgbClr val="000000"/>
-                        </a:solidFill>
-                        <a:effectLst/>
-                        <a:latin typeface="Aptos" panose="020B0004020202020204" pitchFamily="34" charset="0"/>
-                      </a:endParaRPr>
-                    </a:p>
-                  </a:txBody>
-                  <a:tcPr marL="6761" marR="6761" marT="6761" marB="0" anchor="b"/>
+                    </a:p>
+                  </a:txBody>
+                  <a:tcPr marL="9525" marR="9525" marT="9525" marB="0" anchor="b"/>
                 </a:tc>
                 <a:tc>
                   <a:txBody>
@@ -19828,13 +19686,13 @@
                             <a:srgbClr val="000000"/>
                           </a:solidFill>
                           <a:effectLst/>
-                          <a:latin typeface="Aptos Narrow" panose="020B0004020202020204" pitchFamily="34" charset="0"/>
-                        </a:rPr>
-                        <a:t>60,1146106</a:t>
-                      </a:r>
-                    </a:p>
-                  </a:txBody>
-                  <a:tcPr marL="7620" marR="7620" marT="7620" marB="0" anchor="b"/>
+                          <a:latin typeface="Aptos" panose="020B0004020202020204" pitchFamily="34" charset="0"/>
+                        </a:rPr>
+                        <a:t>67,8994977</a:t>
+                      </a:r>
+                    </a:p>
+                  </a:txBody>
+                  <a:tcPr marL="9525" marR="9525" marT="9525" marB="0" anchor="b"/>
                 </a:tc>
                 <a:tc>
                   <a:txBody>
@@ -19848,13 +19706,13 @@
                             <a:srgbClr val="000000"/>
                           </a:solidFill>
                           <a:effectLst/>
-                          <a:latin typeface="Aptos Narrow" panose="020B0004020202020204" pitchFamily="34" charset="0"/>
-                        </a:rPr>
-                        <a:t>3</a:t>
-                      </a:r>
-                    </a:p>
-                  </a:txBody>
-                  <a:tcPr marL="7620" marR="7620" marT="7620" marB="0" anchor="b"/>
+                          <a:latin typeface="Aptos" panose="020B0004020202020204" pitchFamily="34" charset="0"/>
+                        </a:rPr>
+                        <a:t>2</a:t>
+                      </a:r>
+                    </a:p>
+                  </a:txBody>
+                  <a:tcPr marL="9525" marR="9525" marT="9525" marB="0" anchor="b"/>
                 </a:tc>
                 <a:extLst>
                   <a:ext uri="{0D108BD9-81ED-4DB2-BD59-A6C34878D82A}">
@@ -19894,118 +19752,98 @@
                     <a:p>
                       <a:pPr algn="r" fontAlgn="b"/>
                       <a:r>
-                        <a:rPr lang="fr-BE" sz="1600" u="none" strike="noStrike">
+                        <a:rPr lang="fr-BE" sz="1600" b="0" i="0" u="none" strike="noStrike">
+                          <a:solidFill>
+                            <a:srgbClr val="000000"/>
+                          </a:solidFill>
                           <a:effectLst/>
                           <a:latin typeface="Aptos" panose="020B0004020202020204" pitchFamily="34" charset="0"/>
                         </a:rPr>
                         <a:t>80</a:t>
                       </a:r>
-                      <a:endParaRPr lang="fr-BE" sz="1600" b="0" i="0" u="none" strike="noStrike">
-                        <a:solidFill>
-                          <a:srgbClr val="000000"/>
-                        </a:solidFill>
-                        <a:effectLst/>
-                        <a:latin typeface="Aptos" panose="020B0004020202020204" pitchFamily="34" charset="0"/>
-                      </a:endParaRPr>
-                    </a:p>
-                  </a:txBody>
-                  <a:tcPr marL="6761" marR="6761" marT="6761" marB="0" anchor="b"/>
-                </a:tc>
-                <a:tc>
-                  <a:txBody>
-                    <a:bodyPr/>
-                    <a:lstStyle/>
-                    <a:p>
-                      <a:pPr algn="r" fontAlgn="b"/>
-                      <a:r>
-                        <a:rPr lang="fr-BE" sz="1600" u="none" strike="noStrike">
+                    </a:p>
+                  </a:txBody>
+                  <a:tcPr marL="9525" marR="9525" marT="9525" marB="0" anchor="b"/>
+                </a:tc>
+                <a:tc>
+                  <a:txBody>
+                    <a:bodyPr/>
+                    <a:lstStyle/>
+                    <a:p>
+                      <a:pPr algn="r" fontAlgn="b"/>
+                      <a:r>
+                        <a:rPr lang="fr-BE" sz="1600" b="0" i="0" u="none" strike="noStrike">
+                          <a:solidFill>
+                            <a:srgbClr val="000000"/>
+                          </a:solidFill>
                           <a:effectLst/>
                           <a:latin typeface="Aptos" panose="020B0004020202020204" pitchFamily="34" charset="0"/>
                         </a:rPr>
                         <a:t>80</a:t>
                       </a:r>
-                      <a:endParaRPr lang="fr-BE" sz="1600" b="0" i="0" u="none" strike="noStrike">
-                        <a:solidFill>
-                          <a:srgbClr val="000000"/>
-                        </a:solidFill>
-                        <a:effectLst/>
-                        <a:latin typeface="Aptos" panose="020B0004020202020204" pitchFamily="34" charset="0"/>
-                      </a:endParaRPr>
-                    </a:p>
-                  </a:txBody>
-                  <a:tcPr marL="6761" marR="6761" marT="6761" marB="0" anchor="b"/>
-                </a:tc>
-                <a:tc>
-                  <a:txBody>
-                    <a:bodyPr/>
-                    <a:lstStyle/>
-                    <a:p>
-                      <a:pPr algn="r" fontAlgn="b"/>
-                      <a:r>
-                        <a:rPr lang="fr-BE" sz="1600" u="none" strike="noStrike" dirty="0">
+                    </a:p>
+                  </a:txBody>
+                  <a:tcPr marL="9525" marR="9525" marT="9525" marB="0" anchor="b"/>
+                </a:tc>
+                <a:tc>
+                  <a:txBody>
+                    <a:bodyPr/>
+                    <a:lstStyle/>
+                    <a:p>
+                      <a:pPr algn="r" fontAlgn="b"/>
+                      <a:r>
+                        <a:rPr lang="fr-BE" sz="1600" b="0" i="0" u="none" strike="noStrike">
+                          <a:solidFill>
+                            <a:srgbClr val="000000"/>
+                          </a:solidFill>
                           <a:effectLst/>
                           <a:latin typeface="Aptos" panose="020B0004020202020204" pitchFamily="34" charset="0"/>
                         </a:rPr>
                         <a:t>0</a:t>
                       </a:r>
-                      <a:endParaRPr lang="fr-BE" sz="1600" b="0" i="0" u="none" strike="noStrike" dirty="0">
-                        <a:solidFill>
-                          <a:srgbClr val="000000"/>
-                        </a:solidFill>
-                        <a:effectLst/>
-                        <a:latin typeface="Aptos" panose="020B0004020202020204" pitchFamily="34" charset="0"/>
-                      </a:endParaRPr>
-                    </a:p>
-                  </a:txBody>
-                  <a:tcPr marL="6761" marR="6761" marT="6761" marB="0" anchor="b"/>
-                </a:tc>
-                <a:tc>
-                  <a:txBody>
-                    <a:bodyPr/>
-                    <a:lstStyle/>
-                    <a:p>
-                      <a:pPr algn="r" fontAlgn="b"/>
-                      <a:r>
-                        <a:rPr lang="fr-BE" sz="1600" u="none" strike="noStrike" dirty="0">
+                    </a:p>
+                  </a:txBody>
+                  <a:tcPr marL="9525" marR="9525" marT="9525" marB="0" anchor="b"/>
+                </a:tc>
+                <a:tc>
+                  <a:txBody>
+                    <a:bodyPr/>
+                    <a:lstStyle/>
+                    <a:p>
+                      <a:pPr algn="r" fontAlgn="b"/>
+                      <a:r>
+                        <a:rPr lang="fr-BE" sz="1600" b="0" i="0" u="none" strike="noStrike">
+                          <a:solidFill>
+                            <a:srgbClr val="000000"/>
+                          </a:solidFill>
                           <a:effectLst/>
                           <a:latin typeface="Aptos" panose="020B0004020202020204" pitchFamily="34" charset="0"/>
                         </a:rPr>
-                        <a:t>44,4444444</a:t>
-                      </a:r>
-                      <a:endParaRPr lang="fr-BE" sz="1600" b="0" i="0" u="none" strike="noStrike" dirty="0">
-                        <a:solidFill>
-                          <a:srgbClr val="000000"/>
-                        </a:solidFill>
-                        <a:effectLst/>
-                        <a:latin typeface="Aptos" panose="020B0004020202020204" pitchFamily="34" charset="0"/>
-                      </a:endParaRPr>
-                    </a:p>
-                  </a:txBody>
-                  <a:tcPr marL="6761" marR="6761" marT="6761" marB="0" anchor="b"/>
-                </a:tc>
-                <a:tc>
-                  <a:txBody>
-                    <a:bodyPr/>
-                    <a:lstStyle/>
-                    <a:p>
-                      <a:pPr algn="r" fontAlgn="b"/>
-                      <a:r>
-                        <a:rPr lang="fr-BE" sz="1600" u="none" strike="noStrike" dirty="0">
+                        <a:t>44,44444444</a:t>
+                      </a:r>
+                    </a:p>
+                  </a:txBody>
+                  <a:tcPr marL="9525" marR="9525" marT="9525" marB="0" anchor="b"/>
+                </a:tc>
+                <a:tc>
+                  <a:txBody>
+                    <a:bodyPr/>
+                    <a:lstStyle/>
+                    <a:p>
+                      <a:pPr algn="r" fontAlgn="b"/>
+                      <a:r>
+                        <a:rPr lang="fr-BE" sz="1600" b="0" i="0" u="none" strike="noStrike" dirty="0">
+                          <a:solidFill>
+                            <a:srgbClr val="000000"/>
+                          </a:solidFill>
                           <a:effectLst/>
                           <a:latin typeface="Aptos" panose="020B0004020202020204" pitchFamily="34" charset="0"/>
                         </a:rPr>
                         <a:t>97,961264</a:t>
                       </a:r>
-                      <a:endParaRPr lang="fr-BE" sz="1600" b="0" i="0" u="none" strike="noStrike" dirty="0">
-                        <a:solidFill>
-                          <a:srgbClr val="000000"/>
-                        </a:solidFill>
-                        <a:effectLst/>
-                        <a:latin typeface="Aptos" panose="020B0004020202020204" pitchFamily="34" charset="0"/>
-                      </a:endParaRPr>
-                    </a:p>
-                  </a:txBody>
-                  <a:tcPr marL="6761" marR="6761" marT="6761" marB="0" anchor="b"/>
+                    </a:p>
+                  </a:txBody>
+                  <a:tcPr marL="9525" marR="9525" marT="9525" marB="0" anchor="b"/>
                 </a:tc>
                 <a:tc>
                   <a:txBody>
@@ -20019,13 +19857,13 @@
                             <a:srgbClr val="000000"/>
                           </a:solidFill>
                           <a:effectLst/>
-                          <a:latin typeface="Aptos Narrow" panose="020B0004020202020204" pitchFamily="34" charset="0"/>
-                        </a:rPr>
-                        <a:t>4,62919478</a:t>
-                      </a:r>
-                    </a:p>
-                  </a:txBody>
-                  <a:tcPr marL="7620" marR="7620" marT="7620" marB="0" anchor="b"/>
+                          <a:latin typeface="Aptos" panose="020B0004020202020204" pitchFamily="34" charset="0"/>
+                        </a:rPr>
+                        <a:t>36,8412587</a:t>
+                      </a:r>
+                    </a:p>
+                  </a:txBody>
+                  <a:tcPr marL="9525" marR="9525" marT="9525" marB="0" anchor="b"/>
                 </a:tc>
                 <a:tc>
                   <a:txBody>
@@ -20039,13 +19877,13 @@
                             <a:srgbClr val="000000"/>
                           </a:solidFill>
                           <a:effectLst/>
-                          <a:latin typeface="Aptos Narrow" panose="020B0004020202020204" pitchFamily="34" charset="0"/>
+                          <a:latin typeface="Aptos" panose="020B0004020202020204" pitchFamily="34" charset="0"/>
                         </a:rPr>
                         <a:t>9</a:t>
                       </a:r>
                     </a:p>
                   </a:txBody>
-                  <a:tcPr marL="7620" marR="7620" marT="7620" marB="0" anchor="b"/>
+                  <a:tcPr marL="9525" marR="9525" marT="9525" marB="0" anchor="b"/>
                 </a:tc>
                 <a:extLst>
                   <a:ext uri="{0D108BD9-81ED-4DB2-BD59-A6C34878D82A}">

</xml_diff>